<commit_message>
final changes to presentation
</commit_message>
<xml_diff>
--- a/SweetVerse_Presentation.pptx
+++ b/SweetVerse_Presentation.pptx
@@ -7,10 +7,11 @@
   <p:sldIdLst>
     <p:sldId id="256" r:id="rId2"/>
     <p:sldId id="257" r:id="rId3"/>
-    <p:sldId id="258" r:id="rId4"/>
-    <p:sldId id="259" r:id="rId5"/>
-    <p:sldId id="260" r:id="rId6"/>
-    <p:sldId id="261" r:id="rId7"/>
+    <p:sldId id="262" r:id="rId4"/>
+    <p:sldId id="258" r:id="rId5"/>
+    <p:sldId id="259" r:id="rId6"/>
+    <p:sldId id="260" r:id="rId7"/>
+    <p:sldId id="261" r:id="rId8"/>
   </p:sldIdLst>
   <p:sldSz cx="12192000" cy="6858000"/>
   <p:notesSz cx="6858000" cy="9144000"/>
@@ -110,6 +111,2643 @@
     </a:lvl9pPr>
   </p:defaultTextStyle>
 </p:presentation>
+</file>
+
+<file path=ppt/diagrams/colors1.xml><?xml version="1.0" encoding="utf-8"?>
+<dgm:colorsDef xmlns:dgm="http://schemas.openxmlformats.org/drawingml/2006/diagram" xmlns:a="http://schemas.openxmlformats.org/drawingml/2006/main" uniqueId="urn:microsoft.com/office/officeart/2005/8/colors/accent0_3">
+  <dgm:title val=""/>
+  <dgm:desc val=""/>
+  <dgm:catLst>
+    <dgm:cat type="mainScheme" pri="10300"/>
+  </dgm:catLst>
+  <dgm:styleLbl name="node0">
+    <dgm:fillClrLst meth="repeat">
+      <a:schemeClr val="dk2"/>
+    </dgm:fillClrLst>
+    <dgm:linClrLst meth="repeat">
+      <a:schemeClr val="lt2"/>
+    </dgm:linClrLst>
+    <dgm:effectClrLst/>
+    <dgm:txLinClrLst/>
+    <dgm:txFillClrLst/>
+    <dgm:txEffectClrLst/>
+  </dgm:styleLbl>
+  <dgm:styleLbl name="alignNode1">
+    <dgm:fillClrLst meth="repeat">
+      <a:schemeClr val="dk2"/>
+    </dgm:fillClrLst>
+    <dgm:linClrLst meth="repeat">
+      <a:schemeClr val="dk2"/>
+    </dgm:linClrLst>
+    <dgm:effectClrLst/>
+    <dgm:txLinClrLst/>
+    <dgm:txFillClrLst/>
+    <dgm:txEffectClrLst/>
+  </dgm:styleLbl>
+  <dgm:styleLbl name="node1">
+    <dgm:fillClrLst meth="repeat">
+      <a:schemeClr val="dk2"/>
+    </dgm:fillClrLst>
+    <dgm:linClrLst meth="repeat">
+      <a:schemeClr val="lt2"/>
+    </dgm:linClrLst>
+    <dgm:effectClrLst/>
+    <dgm:txLinClrLst/>
+    <dgm:txFillClrLst/>
+    <dgm:txEffectClrLst/>
+  </dgm:styleLbl>
+  <dgm:styleLbl name="lnNode1">
+    <dgm:fillClrLst meth="repeat">
+      <a:schemeClr val="dk2"/>
+    </dgm:fillClrLst>
+    <dgm:linClrLst meth="repeat">
+      <a:schemeClr val="lt2"/>
+    </dgm:linClrLst>
+    <dgm:effectClrLst/>
+    <dgm:txLinClrLst/>
+    <dgm:txFillClrLst/>
+    <dgm:txEffectClrLst/>
+  </dgm:styleLbl>
+  <dgm:styleLbl name="vennNode1">
+    <dgm:fillClrLst meth="repeat">
+      <a:schemeClr val="dk2">
+        <a:alpha val="50000"/>
+      </a:schemeClr>
+    </dgm:fillClrLst>
+    <dgm:linClrLst meth="repeat">
+      <a:schemeClr val="lt2"/>
+    </dgm:linClrLst>
+    <dgm:effectClrLst/>
+    <dgm:txLinClrLst/>
+    <dgm:txFillClrLst/>
+    <dgm:txEffectClrLst/>
+  </dgm:styleLbl>
+  <dgm:styleLbl name="node2">
+    <dgm:fillClrLst meth="repeat">
+      <a:schemeClr val="dk2"/>
+    </dgm:fillClrLst>
+    <dgm:linClrLst meth="repeat">
+      <a:schemeClr val="lt2"/>
+    </dgm:linClrLst>
+    <dgm:effectClrLst/>
+    <dgm:txLinClrLst/>
+    <dgm:txFillClrLst/>
+    <dgm:txEffectClrLst/>
+  </dgm:styleLbl>
+  <dgm:styleLbl name="node3">
+    <dgm:fillClrLst meth="repeat">
+      <a:schemeClr val="dk2"/>
+    </dgm:fillClrLst>
+    <dgm:linClrLst meth="repeat">
+      <a:schemeClr val="lt2"/>
+    </dgm:linClrLst>
+    <dgm:effectClrLst/>
+    <dgm:txLinClrLst/>
+    <dgm:txFillClrLst/>
+    <dgm:txEffectClrLst/>
+  </dgm:styleLbl>
+  <dgm:styleLbl name="node4">
+    <dgm:fillClrLst meth="repeat">
+      <a:schemeClr val="dk2"/>
+    </dgm:fillClrLst>
+    <dgm:linClrLst meth="repeat">
+      <a:schemeClr val="lt2"/>
+    </dgm:linClrLst>
+    <dgm:effectClrLst/>
+    <dgm:txLinClrLst/>
+    <dgm:txFillClrLst/>
+    <dgm:txEffectClrLst/>
+  </dgm:styleLbl>
+  <dgm:styleLbl name="fgImgPlace1">
+    <dgm:fillClrLst meth="repeat">
+      <a:schemeClr val="dk2">
+        <a:tint val="50000"/>
+      </a:schemeClr>
+    </dgm:fillClrLst>
+    <dgm:linClrLst meth="repeat">
+      <a:schemeClr val="lt2"/>
+    </dgm:linClrLst>
+    <dgm:effectClrLst/>
+    <dgm:txLinClrLst/>
+    <dgm:txFillClrLst meth="repeat">
+      <a:schemeClr val="lt2"/>
+    </dgm:txFillClrLst>
+    <dgm:txEffectClrLst/>
+  </dgm:styleLbl>
+  <dgm:styleLbl name="alignImgPlace1">
+    <dgm:fillClrLst meth="repeat">
+      <a:schemeClr val="dk2">
+        <a:tint val="50000"/>
+      </a:schemeClr>
+    </dgm:fillClrLst>
+    <dgm:linClrLst meth="repeat">
+      <a:schemeClr val="dk2">
+        <a:shade val="80000"/>
+      </a:schemeClr>
+    </dgm:linClrLst>
+    <dgm:effectClrLst/>
+    <dgm:txLinClrLst/>
+    <dgm:txFillClrLst meth="repeat">
+      <a:schemeClr val="lt2"/>
+    </dgm:txFillClrLst>
+    <dgm:txEffectClrLst/>
+  </dgm:styleLbl>
+  <dgm:styleLbl name="bgImgPlace1">
+    <dgm:fillClrLst meth="repeat">
+      <a:schemeClr val="dk2">
+        <a:tint val="50000"/>
+      </a:schemeClr>
+    </dgm:fillClrLst>
+    <dgm:linClrLst meth="repeat">
+      <a:schemeClr val="dk2">
+        <a:shade val="80000"/>
+      </a:schemeClr>
+    </dgm:linClrLst>
+    <dgm:effectClrLst/>
+    <dgm:txLinClrLst/>
+    <dgm:txFillClrLst meth="repeat">
+      <a:schemeClr val="lt2"/>
+    </dgm:txFillClrLst>
+    <dgm:txEffectClrLst/>
+  </dgm:styleLbl>
+  <dgm:styleLbl name="sibTrans2D1">
+    <dgm:fillClrLst meth="repeat">
+      <a:schemeClr val="dk2">
+        <a:tint val="60000"/>
+      </a:schemeClr>
+    </dgm:fillClrLst>
+    <dgm:linClrLst meth="repeat">
+      <a:schemeClr val="dk2">
+        <a:tint val="60000"/>
+      </a:schemeClr>
+    </dgm:linClrLst>
+    <dgm:effectClrLst/>
+    <dgm:txLinClrLst/>
+    <dgm:txFillClrLst/>
+    <dgm:txEffectClrLst/>
+  </dgm:styleLbl>
+  <dgm:styleLbl name="fgSibTrans2D1">
+    <dgm:fillClrLst meth="repeat">
+      <a:schemeClr val="dk2">
+        <a:tint val="60000"/>
+      </a:schemeClr>
+    </dgm:fillClrLst>
+    <dgm:linClrLst meth="repeat">
+      <a:schemeClr val="dk2">
+        <a:tint val="60000"/>
+      </a:schemeClr>
+    </dgm:linClrLst>
+    <dgm:effectClrLst/>
+    <dgm:txLinClrLst/>
+    <dgm:txFillClrLst/>
+    <dgm:txEffectClrLst/>
+  </dgm:styleLbl>
+  <dgm:styleLbl name="bgSibTrans2D1">
+    <dgm:fillClrLst meth="repeat">
+      <a:schemeClr val="dk2">
+        <a:tint val="60000"/>
+      </a:schemeClr>
+    </dgm:fillClrLst>
+    <dgm:linClrLst meth="repeat">
+      <a:schemeClr val="dk2">
+        <a:tint val="60000"/>
+      </a:schemeClr>
+    </dgm:linClrLst>
+    <dgm:effectClrLst/>
+    <dgm:txLinClrLst/>
+    <dgm:txFillClrLst/>
+    <dgm:txEffectClrLst/>
+  </dgm:styleLbl>
+  <dgm:styleLbl name="sibTrans1D1">
+    <dgm:fillClrLst meth="repeat">
+      <a:schemeClr val="dk2"/>
+    </dgm:fillClrLst>
+    <dgm:linClrLst meth="repeat">
+      <a:schemeClr val="dk2"/>
+    </dgm:linClrLst>
+    <dgm:effectClrLst/>
+    <dgm:txLinClrLst/>
+    <dgm:txFillClrLst meth="repeat">
+      <a:schemeClr val="lt2"/>
+    </dgm:txFillClrLst>
+    <dgm:txEffectClrLst/>
+  </dgm:styleLbl>
+  <dgm:styleLbl name="callout">
+    <dgm:fillClrLst meth="repeat">
+      <a:schemeClr val="dk2"/>
+    </dgm:fillClrLst>
+    <dgm:linClrLst meth="repeat">
+      <a:schemeClr val="dk2">
+        <a:tint val="50000"/>
+      </a:schemeClr>
+    </dgm:linClrLst>
+    <dgm:effectClrLst/>
+    <dgm:txLinClrLst/>
+    <dgm:txFillClrLst meth="repeat">
+      <a:schemeClr val="lt2"/>
+    </dgm:txFillClrLst>
+    <dgm:txEffectClrLst/>
+  </dgm:styleLbl>
+  <dgm:styleLbl name="asst0">
+    <dgm:fillClrLst meth="repeat">
+      <a:schemeClr val="dk2"/>
+    </dgm:fillClrLst>
+    <dgm:linClrLst meth="repeat">
+      <a:schemeClr val="lt2"/>
+    </dgm:linClrLst>
+    <dgm:effectClrLst/>
+    <dgm:txLinClrLst/>
+    <dgm:txFillClrLst/>
+    <dgm:txEffectClrLst/>
+  </dgm:styleLbl>
+  <dgm:styleLbl name="asst1">
+    <dgm:fillClrLst meth="repeat">
+      <a:schemeClr val="dk2"/>
+    </dgm:fillClrLst>
+    <dgm:linClrLst meth="repeat">
+      <a:schemeClr val="lt2"/>
+    </dgm:linClrLst>
+    <dgm:effectClrLst/>
+    <dgm:txLinClrLst/>
+    <dgm:txFillClrLst/>
+    <dgm:txEffectClrLst/>
+  </dgm:styleLbl>
+  <dgm:styleLbl name="asst2">
+    <dgm:fillClrLst meth="repeat">
+      <a:schemeClr val="dk2"/>
+    </dgm:fillClrLst>
+    <dgm:linClrLst meth="repeat">
+      <a:schemeClr val="lt2"/>
+    </dgm:linClrLst>
+    <dgm:effectClrLst/>
+    <dgm:txLinClrLst/>
+    <dgm:txFillClrLst/>
+    <dgm:txEffectClrLst/>
+  </dgm:styleLbl>
+  <dgm:styleLbl name="asst3">
+    <dgm:fillClrLst meth="repeat">
+      <a:schemeClr val="dk2"/>
+    </dgm:fillClrLst>
+    <dgm:linClrLst meth="repeat">
+      <a:schemeClr val="lt2"/>
+    </dgm:linClrLst>
+    <dgm:effectClrLst/>
+    <dgm:txLinClrLst/>
+    <dgm:txFillClrLst/>
+    <dgm:txEffectClrLst/>
+  </dgm:styleLbl>
+  <dgm:styleLbl name="asst4">
+    <dgm:fillClrLst meth="repeat">
+      <a:schemeClr val="dk2"/>
+    </dgm:fillClrLst>
+    <dgm:linClrLst meth="repeat">
+      <a:schemeClr val="lt2"/>
+    </dgm:linClrLst>
+    <dgm:effectClrLst/>
+    <dgm:txLinClrLst/>
+    <dgm:txFillClrLst/>
+    <dgm:txEffectClrLst/>
+  </dgm:styleLbl>
+  <dgm:styleLbl name="parChTrans2D1">
+    <dgm:fillClrLst meth="repeat">
+      <a:schemeClr val="dk2">
+        <a:tint val="60000"/>
+      </a:schemeClr>
+    </dgm:fillClrLst>
+    <dgm:linClrLst meth="repeat">
+      <a:schemeClr val="dk2">
+        <a:tint val="60000"/>
+      </a:schemeClr>
+    </dgm:linClrLst>
+    <dgm:effectClrLst/>
+    <dgm:txLinClrLst/>
+    <dgm:txFillClrLst meth="repeat">
+      <a:schemeClr val="lt2"/>
+    </dgm:txFillClrLst>
+    <dgm:txEffectClrLst/>
+  </dgm:styleLbl>
+  <dgm:styleLbl name="parChTrans2D2">
+    <dgm:fillClrLst meth="repeat">
+      <a:schemeClr val="dk2"/>
+    </dgm:fillClrLst>
+    <dgm:linClrLst meth="repeat">
+      <a:schemeClr val="dk2"/>
+    </dgm:linClrLst>
+    <dgm:effectClrLst/>
+    <dgm:txLinClrLst/>
+    <dgm:txFillClrLst meth="repeat">
+      <a:schemeClr val="lt2"/>
+    </dgm:txFillClrLst>
+    <dgm:txEffectClrLst/>
+  </dgm:styleLbl>
+  <dgm:styleLbl name="parChTrans2D3">
+    <dgm:fillClrLst meth="repeat">
+      <a:schemeClr val="dk2"/>
+    </dgm:fillClrLst>
+    <dgm:linClrLst meth="repeat">
+      <a:schemeClr val="dk2"/>
+    </dgm:linClrLst>
+    <dgm:effectClrLst/>
+    <dgm:txLinClrLst/>
+    <dgm:txFillClrLst meth="repeat">
+      <a:schemeClr val="lt2"/>
+    </dgm:txFillClrLst>
+    <dgm:txEffectClrLst/>
+  </dgm:styleLbl>
+  <dgm:styleLbl name="parChTrans2D4">
+    <dgm:fillClrLst meth="repeat">
+      <a:schemeClr val="dk2"/>
+    </dgm:fillClrLst>
+    <dgm:linClrLst meth="repeat">
+      <a:schemeClr val="dk2"/>
+    </dgm:linClrLst>
+    <dgm:effectClrLst/>
+    <dgm:txLinClrLst/>
+    <dgm:txFillClrLst meth="repeat">
+      <a:schemeClr val="lt2"/>
+    </dgm:txFillClrLst>
+    <dgm:txEffectClrLst/>
+  </dgm:styleLbl>
+  <dgm:styleLbl name="parChTrans1D1">
+    <dgm:fillClrLst meth="repeat">
+      <a:schemeClr val="dk2"/>
+    </dgm:fillClrLst>
+    <dgm:linClrLst meth="repeat">
+      <a:schemeClr val="dk2">
+        <a:shade val="60000"/>
+      </a:schemeClr>
+    </dgm:linClrLst>
+    <dgm:effectClrLst/>
+    <dgm:txLinClrLst/>
+    <dgm:txFillClrLst meth="repeat">
+      <a:schemeClr val="tx1"/>
+    </dgm:txFillClrLst>
+    <dgm:txEffectClrLst/>
+  </dgm:styleLbl>
+  <dgm:styleLbl name="parChTrans1D2">
+    <dgm:fillClrLst meth="repeat">
+      <a:schemeClr val="dk2"/>
+    </dgm:fillClrLst>
+    <dgm:linClrLst meth="repeat">
+      <a:schemeClr val="dk2">
+        <a:shade val="60000"/>
+      </a:schemeClr>
+    </dgm:linClrLst>
+    <dgm:effectClrLst/>
+    <dgm:txLinClrLst/>
+    <dgm:txFillClrLst meth="repeat">
+      <a:schemeClr val="tx1"/>
+    </dgm:txFillClrLst>
+    <dgm:txEffectClrLst/>
+  </dgm:styleLbl>
+  <dgm:styleLbl name="parChTrans1D3">
+    <dgm:fillClrLst meth="repeat">
+      <a:schemeClr val="dk2"/>
+    </dgm:fillClrLst>
+    <dgm:linClrLst meth="repeat">
+      <a:schemeClr val="dk2">
+        <a:shade val="80000"/>
+      </a:schemeClr>
+    </dgm:linClrLst>
+    <dgm:effectClrLst/>
+    <dgm:txLinClrLst/>
+    <dgm:txFillClrLst meth="repeat">
+      <a:schemeClr val="tx1"/>
+    </dgm:txFillClrLst>
+    <dgm:txEffectClrLst/>
+  </dgm:styleLbl>
+  <dgm:styleLbl name="parChTrans1D4">
+    <dgm:fillClrLst meth="repeat">
+      <a:schemeClr val="dk2"/>
+    </dgm:fillClrLst>
+    <dgm:linClrLst meth="repeat">
+      <a:schemeClr val="dk2">
+        <a:shade val="80000"/>
+      </a:schemeClr>
+    </dgm:linClrLst>
+    <dgm:effectClrLst/>
+    <dgm:txLinClrLst/>
+    <dgm:txFillClrLst meth="repeat">
+      <a:schemeClr val="tx1"/>
+    </dgm:txFillClrLst>
+    <dgm:txEffectClrLst/>
+  </dgm:styleLbl>
+  <dgm:styleLbl name="fgAcc1">
+    <dgm:fillClrLst meth="repeat">
+      <a:schemeClr val="lt2">
+        <a:alpha val="90000"/>
+      </a:schemeClr>
+    </dgm:fillClrLst>
+    <dgm:linClrLst meth="repeat">
+      <a:schemeClr val="dk2"/>
+    </dgm:linClrLst>
+    <dgm:effectClrLst/>
+    <dgm:txLinClrLst/>
+    <dgm:txFillClrLst meth="repeat">
+      <a:schemeClr val="dk1"/>
+    </dgm:txFillClrLst>
+    <dgm:txEffectClrLst/>
+  </dgm:styleLbl>
+  <dgm:styleLbl name="conFgAcc1">
+    <dgm:fillClrLst meth="repeat">
+      <a:schemeClr val="lt2">
+        <a:alpha val="90000"/>
+      </a:schemeClr>
+    </dgm:fillClrLst>
+    <dgm:linClrLst meth="repeat">
+      <a:schemeClr val="dk2"/>
+    </dgm:linClrLst>
+    <dgm:effectClrLst/>
+    <dgm:txLinClrLst/>
+    <dgm:txFillClrLst meth="repeat">
+      <a:schemeClr val="dk1"/>
+    </dgm:txFillClrLst>
+    <dgm:txEffectClrLst/>
+  </dgm:styleLbl>
+  <dgm:styleLbl name="alignAcc1">
+    <dgm:fillClrLst meth="repeat">
+      <a:schemeClr val="lt2">
+        <a:alpha val="90000"/>
+      </a:schemeClr>
+    </dgm:fillClrLst>
+    <dgm:linClrLst meth="repeat">
+      <a:schemeClr val="dk2"/>
+    </dgm:linClrLst>
+    <dgm:effectClrLst/>
+    <dgm:txLinClrLst/>
+    <dgm:txFillClrLst meth="repeat">
+      <a:schemeClr val="dk1"/>
+    </dgm:txFillClrLst>
+    <dgm:txEffectClrLst/>
+  </dgm:styleLbl>
+  <dgm:styleLbl name="trAlignAcc1">
+    <dgm:fillClrLst meth="repeat">
+      <a:schemeClr val="lt2">
+        <a:alpha val="40000"/>
+      </a:schemeClr>
+    </dgm:fillClrLst>
+    <dgm:linClrLst meth="repeat">
+      <a:schemeClr val="dk2"/>
+    </dgm:linClrLst>
+    <dgm:effectClrLst/>
+    <dgm:txLinClrLst/>
+    <dgm:txFillClrLst meth="repeat">
+      <a:schemeClr val="dk1"/>
+    </dgm:txFillClrLst>
+    <dgm:txEffectClrLst/>
+  </dgm:styleLbl>
+  <dgm:styleLbl name="bgAcc1">
+    <dgm:fillClrLst meth="repeat">
+      <a:schemeClr val="lt2">
+        <a:alpha val="90000"/>
+      </a:schemeClr>
+    </dgm:fillClrLst>
+    <dgm:linClrLst meth="repeat">
+      <a:schemeClr val="dk2"/>
+    </dgm:linClrLst>
+    <dgm:effectClrLst/>
+    <dgm:txLinClrLst/>
+    <dgm:txFillClrLst meth="repeat">
+      <a:schemeClr val="dk1"/>
+    </dgm:txFillClrLst>
+    <dgm:txEffectClrLst/>
+  </dgm:styleLbl>
+  <dgm:styleLbl name="solidFgAcc1">
+    <dgm:fillClrLst meth="repeat">
+      <a:schemeClr val="lt2"/>
+    </dgm:fillClrLst>
+    <dgm:linClrLst meth="repeat">
+      <a:schemeClr val="dk2"/>
+    </dgm:linClrLst>
+    <dgm:effectClrLst/>
+    <dgm:txLinClrLst/>
+    <dgm:txFillClrLst meth="repeat">
+      <a:schemeClr val="dk1"/>
+    </dgm:txFillClrLst>
+    <dgm:txEffectClrLst/>
+  </dgm:styleLbl>
+  <dgm:styleLbl name="solidAlignAcc1">
+    <dgm:fillClrLst meth="repeat">
+      <a:schemeClr val="lt2"/>
+    </dgm:fillClrLst>
+    <dgm:linClrLst meth="repeat">
+      <a:schemeClr val="dk2"/>
+    </dgm:linClrLst>
+    <dgm:effectClrLst/>
+    <dgm:txLinClrLst/>
+    <dgm:txFillClrLst meth="repeat">
+      <a:schemeClr val="dk1"/>
+    </dgm:txFillClrLst>
+    <dgm:txEffectClrLst/>
+  </dgm:styleLbl>
+  <dgm:styleLbl name="solidBgAcc1">
+    <dgm:fillClrLst meth="repeat">
+      <a:schemeClr val="lt2"/>
+    </dgm:fillClrLst>
+    <dgm:linClrLst meth="repeat">
+      <a:schemeClr val="dk2"/>
+    </dgm:linClrLst>
+    <dgm:effectClrLst/>
+    <dgm:txLinClrLst/>
+    <dgm:txFillClrLst meth="repeat">
+      <a:schemeClr val="dk1"/>
+    </dgm:txFillClrLst>
+    <dgm:txEffectClrLst/>
+  </dgm:styleLbl>
+  <dgm:styleLbl name="fgAccFollowNode1">
+    <dgm:fillClrLst meth="repeat">
+      <a:schemeClr val="dk2">
+        <a:alpha val="90000"/>
+        <a:tint val="40000"/>
+      </a:schemeClr>
+    </dgm:fillClrLst>
+    <dgm:linClrLst meth="repeat">
+      <a:schemeClr val="dk2">
+        <a:alpha val="90000"/>
+        <a:tint val="40000"/>
+      </a:schemeClr>
+    </dgm:linClrLst>
+    <dgm:effectClrLst/>
+    <dgm:txLinClrLst/>
+    <dgm:txFillClrLst meth="repeat">
+      <a:schemeClr val="dk1"/>
+    </dgm:txFillClrLst>
+    <dgm:txEffectClrLst/>
+  </dgm:styleLbl>
+  <dgm:styleLbl name="alignAccFollowNode1">
+    <dgm:fillClrLst meth="repeat">
+      <a:schemeClr val="dk2">
+        <a:alpha val="90000"/>
+        <a:tint val="40000"/>
+      </a:schemeClr>
+    </dgm:fillClrLst>
+    <dgm:linClrLst meth="repeat">
+      <a:schemeClr val="dk2">
+        <a:alpha val="90000"/>
+        <a:tint val="40000"/>
+      </a:schemeClr>
+    </dgm:linClrLst>
+    <dgm:effectClrLst/>
+    <dgm:txLinClrLst/>
+    <dgm:txFillClrLst meth="repeat">
+      <a:schemeClr val="dk1"/>
+    </dgm:txFillClrLst>
+    <dgm:txEffectClrLst/>
+  </dgm:styleLbl>
+  <dgm:styleLbl name="bgAccFollowNode1">
+    <dgm:fillClrLst meth="repeat">
+      <a:schemeClr val="dk2">
+        <a:alpha val="90000"/>
+        <a:tint val="40000"/>
+      </a:schemeClr>
+    </dgm:fillClrLst>
+    <dgm:linClrLst meth="repeat">
+      <a:schemeClr val="dk2">
+        <a:alpha val="90000"/>
+        <a:tint val="40000"/>
+      </a:schemeClr>
+    </dgm:linClrLst>
+    <dgm:effectClrLst/>
+    <dgm:txLinClrLst/>
+    <dgm:txFillClrLst meth="repeat">
+      <a:schemeClr val="dk1"/>
+    </dgm:txFillClrLst>
+    <dgm:txEffectClrLst/>
+  </dgm:styleLbl>
+  <dgm:styleLbl name="fgAcc0">
+    <dgm:fillClrLst meth="repeat">
+      <a:schemeClr val="lt2">
+        <a:alpha val="90000"/>
+      </a:schemeClr>
+    </dgm:fillClrLst>
+    <dgm:linClrLst meth="repeat">
+      <a:schemeClr val="dk2"/>
+    </dgm:linClrLst>
+    <dgm:effectClrLst/>
+    <dgm:txLinClrLst/>
+    <dgm:txFillClrLst meth="repeat">
+      <a:schemeClr val="dk1"/>
+    </dgm:txFillClrLst>
+    <dgm:txEffectClrLst/>
+  </dgm:styleLbl>
+  <dgm:styleLbl name="fgAcc2">
+    <dgm:fillClrLst meth="repeat">
+      <a:schemeClr val="lt2">
+        <a:alpha val="90000"/>
+      </a:schemeClr>
+    </dgm:fillClrLst>
+    <dgm:linClrLst meth="repeat">
+      <a:schemeClr val="dk2"/>
+    </dgm:linClrLst>
+    <dgm:effectClrLst/>
+    <dgm:txLinClrLst/>
+    <dgm:txFillClrLst meth="repeat">
+      <a:schemeClr val="dk1"/>
+    </dgm:txFillClrLst>
+    <dgm:txEffectClrLst/>
+  </dgm:styleLbl>
+  <dgm:styleLbl name="fgAcc3">
+    <dgm:fillClrLst meth="repeat">
+      <a:schemeClr val="lt2">
+        <a:alpha val="90000"/>
+      </a:schemeClr>
+    </dgm:fillClrLst>
+    <dgm:linClrLst meth="repeat">
+      <a:schemeClr val="dk2"/>
+    </dgm:linClrLst>
+    <dgm:effectClrLst/>
+    <dgm:txLinClrLst/>
+    <dgm:txFillClrLst meth="repeat">
+      <a:schemeClr val="dk1"/>
+    </dgm:txFillClrLst>
+    <dgm:txEffectClrLst/>
+  </dgm:styleLbl>
+  <dgm:styleLbl name="fgAcc4">
+    <dgm:fillClrLst meth="repeat">
+      <a:schemeClr val="lt2">
+        <a:alpha val="90000"/>
+      </a:schemeClr>
+    </dgm:fillClrLst>
+    <dgm:linClrLst meth="repeat">
+      <a:schemeClr val="dk2"/>
+    </dgm:linClrLst>
+    <dgm:effectClrLst/>
+    <dgm:txLinClrLst/>
+    <dgm:txFillClrLst meth="repeat">
+      <a:schemeClr val="dk1"/>
+    </dgm:txFillClrLst>
+    <dgm:txEffectClrLst/>
+  </dgm:styleLbl>
+  <dgm:styleLbl name="bgShp">
+    <dgm:fillClrLst meth="repeat">
+      <a:schemeClr val="dk2">
+        <a:tint val="40000"/>
+      </a:schemeClr>
+    </dgm:fillClrLst>
+    <dgm:linClrLst meth="repeat">
+      <a:schemeClr val="dk2"/>
+    </dgm:linClrLst>
+    <dgm:effectClrLst/>
+    <dgm:txLinClrLst/>
+    <dgm:txFillClrLst meth="repeat">
+      <a:schemeClr val="dk1"/>
+    </dgm:txFillClrLst>
+    <dgm:txEffectClrLst/>
+  </dgm:styleLbl>
+  <dgm:styleLbl name="dkBgShp">
+    <dgm:fillClrLst meth="repeat">
+      <a:schemeClr val="dk2">
+        <a:shade val="80000"/>
+      </a:schemeClr>
+    </dgm:fillClrLst>
+    <dgm:linClrLst meth="repeat">
+      <a:schemeClr val="dk2"/>
+    </dgm:linClrLst>
+    <dgm:effectClrLst/>
+    <dgm:txLinClrLst/>
+    <dgm:txFillClrLst meth="repeat">
+      <a:schemeClr val="lt1"/>
+    </dgm:txFillClrLst>
+    <dgm:txEffectClrLst/>
+  </dgm:styleLbl>
+  <dgm:styleLbl name="trBgShp">
+    <dgm:fillClrLst meth="repeat">
+      <a:schemeClr val="dk2">
+        <a:tint val="50000"/>
+        <a:alpha val="40000"/>
+      </a:schemeClr>
+    </dgm:fillClrLst>
+    <dgm:linClrLst meth="repeat">
+      <a:schemeClr val="dk2"/>
+    </dgm:linClrLst>
+    <dgm:effectClrLst/>
+    <dgm:txLinClrLst/>
+    <dgm:txFillClrLst meth="repeat">
+      <a:schemeClr val="lt1"/>
+    </dgm:txFillClrLst>
+    <dgm:txEffectClrLst/>
+  </dgm:styleLbl>
+  <dgm:styleLbl name="fgShp">
+    <dgm:fillClrLst meth="repeat">
+      <a:schemeClr val="dk2">
+        <a:tint val="60000"/>
+      </a:schemeClr>
+    </dgm:fillClrLst>
+    <dgm:linClrLst meth="repeat">
+      <a:schemeClr val="lt2"/>
+    </dgm:linClrLst>
+    <dgm:effectClrLst/>
+    <dgm:txLinClrLst/>
+    <dgm:txFillClrLst meth="repeat">
+      <a:schemeClr val="dk1"/>
+    </dgm:txFillClrLst>
+    <dgm:txEffectClrLst/>
+  </dgm:styleLbl>
+  <dgm:styleLbl name="revTx">
+    <dgm:fillClrLst meth="repeat">
+      <a:schemeClr val="lt2">
+        <a:alpha val="0"/>
+      </a:schemeClr>
+    </dgm:fillClrLst>
+    <dgm:linClrLst meth="repeat">
+      <a:schemeClr val="dk1">
+        <a:alpha val="0"/>
+      </a:schemeClr>
+    </dgm:linClrLst>
+    <dgm:effectClrLst/>
+    <dgm:txLinClrLst/>
+    <dgm:txFillClrLst meth="repeat">
+      <a:schemeClr val="tx1"/>
+    </dgm:txFillClrLst>
+    <dgm:txEffectClrLst/>
+  </dgm:styleLbl>
+</dgm:colorsDef>
+</file>
+
+<file path=ppt/diagrams/data1.xml><?xml version="1.0" encoding="utf-8"?>
+<dgm:dataModel xmlns:dgm="http://schemas.openxmlformats.org/drawingml/2006/diagram" xmlns:a="http://schemas.openxmlformats.org/drawingml/2006/main">
+  <dgm:ptLst>
+    <dgm:pt modelId="{BA139C35-A548-4EB4-8011-2B1A338179C3}" type="doc">
+      <dgm:prSet loTypeId="urn:microsoft.com/office/officeart/2008/layout/LinedList" loCatId="list" qsTypeId="urn:microsoft.com/office/officeart/2005/8/quickstyle/simple1" qsCatId="simple" csTypeId="urn:microsoft.com/office/officeart/2005/8/colors/accent0_3" csCatId="mainScheme"/>
+      <dgm:spPr/>
+      <dgm:t>
+        <a:bodyPr/>
+        <a:lstStyle/>
+        <a:p>
+          <a:endParaRPr lang="en-US"/>
+        </a:p>
+      </dgm:t>
+    </dgm:pt>
+    <dgm:pt modelId="{1EADF17C-D2C5-4323-BF77-B99CA37174C7}">
+      <dgm:prSet/>
+      <dgm:spPr/>
+      <dgm:t>
+        <a:bodyPr/>
+        <a:lstStyle/>
+        <a:p>
+          <a:r>
+            <a:rPr lang="en-US"/>
+            <a:t>Application</a:t>
+          </a:r>
+        </a:p>
+      </dgm:t>
+    </dgm:pt>
+    <dgm:pt modelId="{3E90974B-39C5-49E2-8227-25D221CF9AE8}" type="parTrans" cxnId="{CE1E79A2-2599-4CB3-97C2-3DBA4D7756FD}">
+      <dgm:prSet/>
+      <dgm:spPr/>
+      <dgm:t>
+        <a:bodyPr/>
+        <a:lstStyle/>
+        <a:p>
+          <a:endParaRPr lang="en-US"/>
+        </a:p>
+      </dgm:t>
+    </dgm:pt>
+    <dgm:pt modelId="{6C49FBE9-38D2-4DE4-B4BF-B477FF6CFF19}" type="sibTrans" cxnId="{CE1E79A2-2599-4CB3-97C2-3DBA4D7756FD}">
+      <dgm:prSet/>
+      <dgm:spPr/>
+      <dgm:t>
+        <a:bodyPr/>
+        <a:lstStyle/>
+        <a:p>
+          <a:endParaRPr lang="en-US"/>
+        </a:p>
+      </dgm:t>
+    </dgm:pt>
+    <dgm:pt modelId="{10269C13-9CC8-4D7B-8944-ECF7FAC31F47}">
+      <dgm:prSet/>
+      <dgm:spPr/>
+      <dgm:t>
+        <a:bodyPr/>
+        <a:lstStyle/>
+        <a:p>
+          <a:r>
+            <a:rPr lang="en-US"/>
+            <a:t>Test Cases</a:t>
+          </a:r>
+        </a:p>
+      </dgm:t>
+    </dgm:pt>
+    <dgm:pt modelId="{057660F0-D20F-4E91-9BE3-415E1A1E13ED}" type="parTrans" cxnId="{100A5C50-63E8-47B0-A35A-2D4814DC63DE}">
+      <dgm:prSet/>
+      <dgm:spPr/>
+      <dgm:t>
+        <a:bodyPr/>
+        <a:lstStyle/>
+        <a:p>
+          <a:endParaRPr lang="en-US"/>
+        </a:p>
+      </dgm:t>
+    </dgm:pt>
+    <dgm:pt modelId="{46833E62-807D-4348-B3C9-9CC85B8F35BF}" type="sibTrans" cxnId="{100A5C50-63E8-47B0-A35A-2D4814DC63DE}">
+      <dgm:prSet/>
+      <dgm:spPr/>
+      <dgm:t>
+        <a:bodyPr/>
+        <a:lstStyle/>
+        <a:p>
+          <a:endParaRPr lang="en-US"/>
+        </a:p>
+      </dgm:t>
+    </dgm:pt>
+    <dgm:pt modelId="{74D05E4E-A082-4BE1-BC27-07217F1B23C8}" type="pres">
+      <dgm:prSet presAssocID="{BA139C35-A548-4EB4-8011-2B1A338179C3}" presName="vert0" presStyleCnt="0">
+        <dgm:presLayoutVars>
+          <dgm:dir/>
+          <dgm:animOne val="branch"/>
+          <dgm:animLvl val="lvl"/>
+        </dgm:presLayoutVars>
+      </dgm:prSet>
+      <dgm:spPr/>
+    </dgm:pt>
+    <dgm:pt modelId="{AFA05C00-10FD-44E3-996B-F7788454CAA3}" type="pres">
+      <dgm:prSet presAssocID="{1EADF17C-D2C5-4323-BF77-B99CA37174C7}" presName="thickLine" presStyleLbl="alignNode1" presStyleIdx="0" presStyleCnt="2"/>
+      <dgm:spPr/>
+    </dgm:pt>
+    <dgm:pt modelId="{00E8AEF1-E78E-4300-B64A-1786C3534D0F}" type="pres">
+      <dgm:prSet presAssocID="{1EADF17C-D2C5-4323-BF77-B99CA37174C7}" presName="horz1" presStyleCnt="0"/>
+      <dgm:spPr/>
+    </dgm:pt>
+    <dgm:pt modelId="{2B7AE46C-4EB3-4870-AC16-A3609AB8CC9A}" type="pres">
+      <dgm:prSet presAssocID="{1EADF17C-D2C5-4323-BF77-B99CA37174C7}" presName="tx1" presStyleLbl="revTx" presStyleIdx="0" presStyleCnt="2"/>
+      <dgm:spPr/>
+    </dgm:pt>
+    <dgm:pt modelId="{17608E90-21B1-46E7-AC21-409E3EFA1A95}" type="pres">
+      <dgm:prSet presAssocID="{1EADF17C-D2C5-4323-BF77-B99CA37174C7}" presName="vert1" presStyleCnt="0"/>
+      <dgm:spPr/>
+    </dgm:pt>
+    <dgm:pt modelId="{68531C24-1C76-4E04-8648-1BE0AC9E428E}" type="pres">
+      <dgm:prSet presAssocID="{10269C13-9CC8-4D7B-8944-ECF7FAC31F47}" presName="thickLine" presStyleLbl="alignNode1" presStyleIdx="1" presStyleCnt="2"/>
+      <dgm:spPr/>
+    </dgm:pt>
+    <dgm:pt modelId="{E3B0D540-9781-4E37-92FC-9EAE5785F291}" type="pres">
+      <dgm:prSet presAssocID="{10269C13-9CC8-4D7B-8944-ECF7FAC31F47}" presName="horz1" presStyleCnt="0"/>
+      <dgm:spPr/>
+    </dgm:pt>
+    <dgm:pt modelId="{96BCBDF9-7412-47AC-9CB4-920C0FFEDD68}" type="pres">
+      <dgm:prSet presAssocID="{10269C13-9CC8-4D7B-8944-ECF7FAC31F47}" presName="tx1" presStyleLbl="revTx" presStyleIdx="1" presStyleCnt="2"/>
+      <dgm:spPr/>
+    </dgm:pt>
+    <dgm:pt modelId="{0718AE8F-F137-4754-955A-E5063B700003}" type="pres">
+      <dgm:prSet presAssocID="{10269C13-9CC8-4D7B-8944-ECF7FAC31F47}" presName="vert1" presStyleCnt="0"/>
+      <dgm:spPr/>
+    </dgm:pt>
+  </dgm:ptLst>
+  <dgm:cxnLst>
+    <dgm:cxn modelId="{5027313D-90D7-4578-8704-DEDAA2F7306B}" type="presOf" srcId="{BA139C35-A548-4EB4-8011-2B1A338179C3}" destId="{74D05E4E-A082-4BE1-BC27-07217F1B23C8}" srcOrd="0" destOrd="0" presId="urn:microsoft.com/office/officeart/2008/layout/LinedList"/>
+    <dgm:cxn modelId="{5231936C-C9DB-4D13-B016-C548FCA1E3D2}" type="presOf" srcId="{10269C13-9CC8-4D7B-8944-ECF7FAC31F47}" destId="{96BCBDF9-7412-47AC-9CB4-920C0FFEDD68}" srcOrd="0" destOrd="0" presId="urn:microsoft.com/office/officeart/2008/layout/LinedList"/>
+    <dgm:cxn modelId="{100A5C50-63E8-47B0-A35A-2D4814DC63DE}" srcId="{BA139C35-A548-4EB4-8011-2B1A338179C3}" destId="{10269C13-9CC8-4D7B-8944-ECF7FAC31F47}" srcOrd="1" destOrd="0" parTransId="{057660F0-D20F-4E91-9BE3-415E1A1E13ED}" sibTransId="{46833E62-807D-4348-B3C9-9CC85B8F35BF}"/>
+    <dgm:cxn modelId="{CE1E79A2-2599-4CB3-97C2-3DBA4D7756FD}" srcId="{BA139C35-A548-4EB4-8011-2B1A338179C3}" destId="{1EADF17C-D2C5-4323-BF77-B99CA37174C7}" srcOrd="0" destOrd="0" parTransId="{3E90974B-39C5-49E2-8227-25D221CF9AE8}" sibTransId="{6C49FBE9-38D2-4DE4-B4BF-B477FF6CFF19}"/>
+    <dgm:cxn modelId="{BCA258AC-A03E-44A5-A1DA-BE4F6177C6FD}" type="presOf" srcId="{1EADF17C-D2C5-4323-BF77-B99CA37174C7}" destId="{2B7AE46C-4EB3-4870-AC16-A3609AB8CC9A}" srcOrd="0" destOrd="0" presId="urn:microsoft.com/office/officeart/2008/layout/LinedList"/>
+    <dgm:cxn modelId="{4A70A1B3-FDEB-48C5-B601-06B872E3DE3F}" type="presParOf" srcId="{74D05E4E-A082-4BE1-BC27-07217F1B23C8}" destId="{AFA05C00-10FD-44E3-996B-F7788454CAA3}" srcOrd="0" destOrd="0" presId="urn:microsoft.com/office/officeart/2008/layout/LinedList"/>
+    <dgm:cxn modelId="{E4376DF9-0BB4-451E-AB3F-A061B89094C1}" type="presParOf" srcId="{74D05E4E-A082-4BE1-BC27-07217F1B23C8}" destId="{00E8AEF1-E78E-4300-B64A-1786C3534D0F}" srcOrd="1" destOrd="0" presId="urn:microsoft.com/office/officeart/2008/layout/LinedList"/>
+    <dgm:cxn modelId="{61FAE0D6-85D6-4F84-989A-21E3E9E3633A}" type="presParOf" srcId="{00E8AEF1-E78E-4300-B64A-1786C3534D0F}" destId="{2B7AE46C-4EB3-4870-AC16-A3609AB8CC9A}" srcOrd="0" destOrd="0" presId="urn:microsoft.com/office/officeart/2008/layout/LinedList"/>
+    <dgm:cxn modelId="{3E1AC96B-0253-4587-94D5-AAA4332A0364}" type="presParOf" srcId="{00E8AEF1-E78E-4300-B64A-1786C3534D0F}" destId="{17608E90-21B1-46E7-AC21-409E3EFA1A95}" srcOrd="1" destOrd="0" presId="urn:microsoft.com/office/officeart/2008/layout/LinedList"/>
+    <dgm:cxn modelId="{5737B427-5ABD-4510-AD6B-E6933008F9ED}" type="presParOf" srcId="{74D05E4E-A082-4BE1-BC27-07217F1B23C8}" destId="{68531C24-1C76-4E04-8648-1BE0AC9E428E}" srcOrd="2" destOrd="0" presId="urn:microsoft.com/office/officeart/2008/layout/LinedList"/>
+    <dgm:cxn modelId="{F35F1EA8-0AA5-4533-A260-1AEFDF203397}" type="presParOf" srcId="{74D05E4E-A082-4BE1-BC27-07217F1B23C8}" destId="{E3B0D540-9781-4E37-92FC-9EAE5785F291}" srcOrd="3" destOrd="0" presId="urn:microsoft.com/office/officeart/2008/layout/LinedList"/>
+    <dgm:cxn modelId="{3F026AEA-8149-4224-9854-631025EF1892}" type="presParOf" srcId="{E3B0D540-9781-4E37-92FC-9EAE5785F291}" destId="{96BCBDF9-7412-47AC-9CB4-920C0FFEDD68}" srcOrd="0" destOrd="0" presId="urn:microsoft.com/office/officeart/2008/layout/LinedList"/>
+    <dgm:cxn modelId="{5FCCDF8C-8EEC-4F2B-8074-2BF302D48FBF}" type="presParOf" srcId="{E3B0D540-9781-4E37-92FC-9EAE5785F291}" destId="{0718AE8F-F137-4754-955A-E5063B700003}" srcOrd="1" destOrd="0" presId="urn:microsoft.com/office/officeart/2008/layout/LinedList"/>
+  </dgm:cxnLst>
+  <dgm:bg/>
+  <dgm:whole/>
+  <dgm:extLst>
+    <a:ext uri="http://schemas.microsoft.com/office/drawing/2008/diagram">
+      <dsp:dataModelExt xmlns:dsp="http://schemas.microsoft.com/office/drawing/2008/diagram" relId="rId6" minVer="http://schemas.openxmlformats.org/drawingml/2006/diagram"/>
+    </a:ext>
+  </dgm:extLst>
+</dgm:dataModel>
+</file>
+
+<file path=ppt/diagrams/drawing1.xml><?xml version="1.0" encoding="utf-8"?>
+<dsp:drawing xmlns:dgm="http://schemas.openxmlformats.org/drawingml/2006/diagram" xmlns:dsp="http://schemas.microsoft.com/office/drawing/2008/diagram" xmlns:a="http://schemas.openxmlformats.org/drawingml/2006/main">
+  <dsp:spTree>
+    <dsp:nvGrpSpPr>
+      <dsp:cNvPr id="0" name=""/>
+      <dsp:cNvGrpSpPr/>
+    </dsp:nvGrpSpPr>
+    <dsp:grpSpPr/>
+    <dsp:sp modelId="{AFA05C00-10FD-44E3-996B-F7788454CAA3}">
+      <dsp:nvSpPr>
+        <dsp:cNvPr id="0" name=""/>
+        <dsp:cNvSpPr/>
+      </dsp:nvSpPr>
+      <dsp:spPr>
+        <a:xfrm>
+          <a:off x="0" y="0"/>
+          <a:ext cx="5605400" cy="0"/>
+        </a:xfrm>
+        <a:prstGeom prst="line">
+          <a:avLst/>
+        </a:prstGeom>
+        <a:solidFill>
+          <a:schemeClr val="dk2">
+            <a:hueOff val="0"/>
+            <a:satOff val="0"/>
+            <a:lumOff val="0"/>
+            <a:alphaOff val="0"/>
+          </a:schemeClr>
+        </a:solidFill>
+        <a:ln w="19050" cap="flat" cmpd="sng" algn="ctr">
+          <a:solidFill>
+            <a:schemeClr val="dk2">
+              <a:hueOff val="0"/>
+              <a:satOff val="0"/>
+              <a:lumOff val="0"/>
+              <a:alphaOff val="0"/>
+            </a:schemeClr>
+          </a:solidFill>
+          <a:prstDash val="solid"/>
+          <a:miter lim="800000"/>
+        </a:ln>
+        <a:effectLst/>
+      </dsp:spPr>
+      <dsp:style>
+        <a:lnRef idx="2">
+          <a:scrgbClr r="0" g="0" b="0"/>
+        </a:lnRef>
+        <a:fillRef idx="1">
+          <a:scrgbClr r="0" g="0" b="0"/>
+        </a:fillRef>
+        <a:effectRef idx="0">
+          <a:scrgbClr r="0" g="0" b="0"/>
+        </a:effectRef>
+        <a:fontRef idx="minor">
+          <a:schemeClr val="lt1"/>
+        </a:fontRef>
+      </dsp:style>
+    </dsp:sp>
+    <dsp:sp modelId="{2B7AE46C-4EB3-4870-AC16-A3609AB8CC9A}">
+      <dsp:nvSpPr>
+        <dsp:cNvPr id="0" name=""/>
+        <dsp:cNvSpPr/>
+      </dsp:nvSpPr>
+      <dsp:spPr>
+        <a:xfrm>
+          <a:off x="0" y="0"/>
+          <a:ext cx="5605400" cy="2769600"/>
+        </a:xfrm>
+        <a:prstGeom prst="rect">
+          <a:avLst/>
+        </a:prstGeom>
+        <a:noFill/>
+        <a:ln>
+          <a:noFill/>
+        </a:ln>
+        <a:effectLst/>
+      </dsp:spPr>
+      <dsp:style>
+        <a:lnRef idx="0">
+          <a:scrgbClr r="0" g="0" b="0"/>
+        </a:lnRef>
+        <a:fillRef idx="0">
+          <a:scrgbClr r="0" g="0" b="0"/>
+        </a:fillRef>
+        <a:effectRef idx="0">
+          <a:scrgbClr r="0" g="0" b="0"/>
+        </a:effectRef>
+        <a:fontRef idx="minor"/>
+      </dsp:style>
+      <dsp:txBody>
+        <a:bodyPr spcFirstLastPara="0" vert="horz" wrap="square" lIns="247650" tIns="247650" rIns="247650" bIns="247650" numCol="1" spcCol="1270" anchor="t" anchorCtr="0">
+          <a:noAutofit/>
+        </a:bodyPr>
+        <a:lstStyle/>
+        <a:p>
+          <a:pPr marL="0" lvl="0" indent="0" algn="l" defTabSz="2889250">
+            <a:lnSpc>
+              <a:spcPct val="90000"/>
+            </a:lnSpc>
+            <a:spcBef>
+              <a:spcPct val="0"/>
+            </a:spcBef>
+            <a:spcAft>
+              <a:spcPct val="35000"/>
+            </a:spcAft>
+            <a:buNone/>
+          </a:pPr>
+          <a:r>
+            <a:rPr lang="en-US" sz="6500" kern="1200"/>
+            <a:t>Application</a:t>
+          </a:r>
+        </a:p>
+      </dsp:txBody>
+      <dsp:txXfrm>
+        <a:off x="0" y="0"/>
+        <a:ext cx="5605400" cy="2769600"/>
+      </dsp:txXfrm>
+    </dsp:sp>
+    <dsp:sp modelId="{68531C24-1C76-4E04-8648-1BE0AC9E428E}">
+      <dsp:nvSpPr>
+        <dsp:cNvPr id="0" name=""/>
+        <dsp:cNvSpPr/>
+      </dsp:nvSpPr>
+      <dsp:spPr>
+        <a:xfrm>
+          <a:off x="0" y="2769600"/>
+          <a:ext cx="5605400" cy="0"/>
+        </a:xfrm>
+        <a:prstGeom prst="line">
+          <a:avLst/>
+        </a:prstGeom>
+        <a:solidFill>
+          <a:schemeClr val="dk2">
+            <a:hueOff val="0"/>
+            <a:satOff val="0"/>
+            <a:lumOff val="0"/>
+            <a:alphaOff val="0"/>
+          </a:schemeClr>
+        </a:solidFill>
+        <a:ln w="19050" cap="flat" cmpd="sng" algn="ctr">
+          <a:solidFill>
+            <a:schemeClr val="dk2">
+              <a:hueOff val="0"/>
+              <a:satOff val="0"/>
+              <a:lumOff val="0"/>
+              <a:alphaOff val="0"/>
+            </a:schemeClr>
+          </a:solidFill>
+          <a:prstDash val="solid"/>
+          <a:miter lim="800000"/>
+        </a:ln>
+        <a:effectLst/>
+      </dsp:spPr>
+      <dsp:style>
+        <a:lnRef idx="2">
+          <a:scrgbClr r="0" g="0" b="0"/>
+        </a:lnRef>
+        <a:fillRef idx="1">
+          <a:scrgbClr r="0" g="0" b="0"/>
+        </a:fillRef>
+        <a:effectRef idx="0">
+          <a:scrgbClr r="0" g="0" b="0"/>
+        </a:effectRef>
+        <a:fontRef idx="minor">
+          <a:schemeClr val="lt1"/>
+        </a:fontRef>
+      </dsp:style>
+    </dsp:sp>
+    <dsp:sp modelId="{96BCBDF9-7412-47AC-9CB4-920C0FFEDD68}">
+      <dsp:nvSpPr>
+        <dsp:cNvPr id="0" name=""/>
+        <dsp:cNvSpPr/>
+      </dsp:nvSpPr>
+      <dsp:spPr>
+        <a:xfrm>
+          <a:off x="0" y="2769600"/>
+          <a:ext cx="5605400" cy="2769600"/>
+        </a:xfrm>
+        <a:prstGeom prst="rect">
+          <a:avLst/>
+        </a:prstGeom>
+        <a:noFill/>
+        <a:ln>
+          <a:noFill/>
+        </a:ln>
+        <a:effectLst/>
+      </dsp:spPr>
+      <dsp:style>
+        <a:lnRef idx="0">
+          <a:scrgbClr r="0" g="0" b="0"/>
+        </a:lnRef>
+        <a:fillRef idx="0">
+          <a:scrgbClr r="0" g="0" b="0"/>
+        </a:fillRef>
+        <a:effectRef idx="0">
+          <a:scrgbClr r="0" g="0" b="0"/>
+        </a:effectRef>
+        <a:fontRef idx="minor"/>
+      </dsp:style>
+      <dsp:txBody>
+        <a:bodyPr spcFirstLastPara="0" vert="horz" wrap="square" lIns="247650" tIns="247650" rIns="247650" bIns="247650" numCol="1" spcCol="1270" anchor="t" anchorCtr="0">
+          <a:noAutofit/>
+        </a:bodyPr>
+        <a:lstStyle/>
+        <a:p>
+          <a:pPr marL="0" lvl="0" indent="0" algn="l" defTabSz="2889250">
+            <a:lnSpc>
+              <a:spcPct val="90000"/>
+            </a:lnSpc>
+            <a:spcBef>
+              <a:spcPct val="0"/>
+            </a:spcBef>
+            <a:spcAft>
+              <a:spcPct val="35000"/>
+            </a:spcAft>
+            <a:buNone/>
+          </a:pPr>
+          <a:r>
+            <a:rPr lang="en-US" sz="6500" kern="1200"/>
+            <a:t>Test Cases</a:t>
+          </a:r>
+        </a:p>
+      </dsp:txBody>
+      <dsp:txXfrm>
+        <a:off x="0" y="2769600"/>
+        <a:ext cx="5605400" cy="2769600"/>
+      </dsp:txXfrm>
+    </dsp:sp>
+  </dsp:spTree>
+</dsp:drawing>
+</file>
+
+<file path=ppt/diagrams/layout1.xml><?xml version="1.0" encoding="utf-8"?>
+<dgm:layoutDef xmlns:dgm="http://schemas.openxmlformats.org/drawingml/2006/diagram" xmlns:a="http://schemas.openxmlformats.org/drawingml/2006/main" uniqueId="urn:microsoft.com/office/officeart/2008/layout/LinedList">
+  <dgm:title val=""/>
+  <dgm:desc val=""/>
+  <dgm:catLst>
+    <dgm:cat type="hierarchy" pri="8000"/>
+    <dgm:cat type="list" pri="2500"/>
+  </dgm:catLst>
+  <dgm:sampData>
+    <dgm:dataModel>
+      <dgm:ptLst>
+        <dgm:pt modelId="0" type="doc"/>
+        <dgm:pt modelId="1">
+          <dgm:prSet phldr="1"/>
+        </dgm:pt>
+        <dgm:pt modelId="11">
+          <dgm:prSet phldr="1"/>
+        </dgm:pt>
+        <dgm:pt modelId="12">
+          <dgm:prSet phldr="1"/>
+        </dgm:pt>
+        <dgm:pt modelId="13">
+          <dgm:prSet phldr="1"/>
+        </dgm:pt>
+      </dgm:ptLst>
+      <dgm:cxnLst>
+        <dgm:cxn modelId="2" srcId="0" destId="1" srcOrd="0" destOrd="0"/>
+        <dgm:cxn modelId="3" srcId="1" destId="11" srcOrd="0" destOrd="0"/>
+        <dgm:cxn modelId="4" srcId="1" destId="12" srcOrd="1" destOrd="0"/>
+        <dgm:cxn modelId="5" srcId="1" destId="13" srcOrd="2" destOrd="0"/>
+      </dgm:cxnLst>
+      <dgm:bg/>
+      <dgm:whole/>
+    </dgm:dataModel>
+  </dgm:sampData>
+  <dgm:styleData>
+    <dgm:dataModel>
+      <dgm:ptLst>
+        <dgm:pt modelId="0" type="doc"/>
+        <dgm:pt modelId="1">
+          <dgm:prSet phldr="1"/>
+        </dgm:pt>
+        <dgm:pt modelId="11">
+          <dgm:prSet phldr="1"/>
+        </dgm:pt>
+        <dgm:pt modelId="12">
+          <dgm:prSet phldr="1"/>
+        </dgm:pt>
+      </dgm:ptLst>
+      <dgm:cxnLst>
+        <dgm:cxn modelId="2" srcId="0" destId="1" srcOrd="0" destOrd="0"/>
+        <dgm:cxn modelId="3" srcId="1" destId="11" srcOrd="0" destOrd="0"/>
+        <dgm:cxn modelId="4" srcId="1" destId="12" srcOrd="1" destOrd="0"/>
+      </dgm:cxnLst>
+      <dgm:bg/>
+      <dgm:whole/>
+    </dgm:dataModel>
+  </dgm:styleData>
+  <dgm:clrData>
+    <dgm:dataModel>
+      <dgm:ptLst>
+        <dgm:pt modelId="0" type="doc"/>
+        <dgm:pt modelId="1">
+          <dgm:prSet phldr="1"/>
+        </dgm:pt>
+        <dgm:pt modelId="11">
+          <dgm:prSet phldr="1"/>
+        </dgm:pt>
+        <dgm:pt modelId="12">
+          <dgm:prSet phldr="1"/>
+        </dgm:pt>
+      </dgm:ptLst>
+      <dgm:cxnLst>
+        <dgm:cxn modelId="2" srcId="0" destId="1" srcOrd="0" destOrd="0"/>
+        <dgm:cxn modelId="3" srcId="1" destId="11" srcOrd="0" destOrd="0"/>
+        <dgm:cxn modelId="4" srcId="1" destId="12" srcOrd="1" destOrd="0"/>
+      </dgm:cxnLst>
+      <dgm:bg/>
+      <dgm:whole/>
+    </dgm:dataModel>
+  </dgm:clrData>
+  <dgm:layoutNode name="vert0">
+    <dgm:varLst>
+      <dgm:dir/>
+      <dgm:animOne val="branch"/>
+      <dgm:animLvl val="lvl"/>
+    </dgm:varLst>
+    <dgm:choose name="Name0">
+      <dgm:if name="Name1" func="var" arg="dir" op="equ" val="norm">
+        <dgm:alg type="lin">
+          <dgm:param type="linDir" val="fromT"/>
+          <dgm:param type="nodeHorzAlign" val="l"/>
+        </dgm:alg>
+      </dgm:if>
+      <dgm:else name="Name2">
+        <dgm:alg type="lin">
+          <dgm:param type="linDir" val="fromT"/>
+          <dgm:param type="nodeHorzAlign" val="r"/>
+        </dgm:alg>
+      </dgm:else>
+    </dgm:choose>
+    <dgm:shape xmlns:r="http://schemas.openxmlformats.org/officeDocument/2006/relationships" r:blip="">
+      <dgm:adjLst/>
+    </dgm:shape>
+    <dgm:presOf/>
+    <dgm:constrLst>
+      <dgm:constr type="w" for="ch" forName="horz1" refType="w"/>
+      <dgm:constr type="h" for="ch" forName="horz1" refType="h"/>
+      <dgm:constr type="h" for="des" forName="vert1" refType="h"/>
+      <dgm:constr type="h" for="des" forName="tx1" refType="h"/>
+      <dgm:constr type="h" for="des" forName="horz2" refType="h"/>
+      <dgm:constr type="h" for="des" forName="vert2" refType="h"/>
+      <dgm:constr type="h" for="des" forName="horz3" refType="h"/>
+      <dgm:constr type="h" for="des" forName="vert3" refType="h"/>
+      <dgm:constr type="h" for="des" forName="horz4" refType="h"/>
+      <dgm:constr type="h" for="des" ptType="node" refType="h"/>
+      <dgm:constr type="primFontSz" for="des" forName="tx1" op="equ" val="65"/>
+      <dgm:constr type="primFontSz" for="des" forName="tx2" op="equ" val="65"/>
+      <dgm:constr type="primFontSz" for="des" forName="tx3" op="equ" val="65"/>
+      <dgm:constr type="primFontSz" for="des" forName="tx4" op="equ" val="65"/>
+      <dgm:constr type="w" for="des" forName="thickLine" refType="w"/>
+      <dgm:constr type="h" for="des" forName="thickLine"/>
+      <dgm:constr type="h" for="des" forName="thinLine1"/>
+      <dgm:constr type="h" for="des" forName="thinLine2b"/>
+      <dgm:constr type="h" for="des" forName="thinLine3"/>
+      <dgm:constr type="h" for="des" forName="vertSpace2a" refType="h" fact="0.05"/>
+      <dgm:constr type="h" for="des" forName="vertSpace2b" refType="h" refFor="des" refForName="vertSpace2a"/>
+    </dgm:constrLst>
+    <dgm:forEach name="Name3" axis="ch" ptType="node">
+      <dgm:layoutNode name="thickLine" styleLbl="alignNode1">
+        <dgm:alg type="sp"/>
+        <dgm:shape xmlns:r="http://schemas.openxmlformats.org/officeDocument/2006/relationships" type="line" r:blip="">
+          <dgm:adjLst/>
+        </dgm:shape>
+        <dgm:presOf/>
+      </dgm:layoutNode>
+      <dgm:layoutNode name="horz1">
+        <dgm:choose name="Name4">
+          <dgm:if name="Name5" func="var" arg="dir" op="equ" val="norm">
+            <dgm:alg type="lin">
+              <dgm:param type="linDir" val="fromL"/>
+              <dgm:param type="nodeVertAlign" val="t"/>
+            </dgm:alg>
+          </dgm:if>
+          <dgm:else name="Name6">
+            <dgm:alg type="lin">
+              <dgm:param type="linDir" val="fromR"/>
+              <dgm:param type="nodeVertAlign" val="t"/>
+            </dgm:alg>
+          </dgm:else>
+        </dgm:choose>
+        <dgm:shape xmlns:r="http://schemas.openxmlformats.org/officeDocument/2006/relationships" r:blip="">
+          <dgm:adjLst/>
+        </dgm:shape>
+        <dgm:presOf/>
+        <dgm:choose name="Name7">
+          <dgm:if name="Name8" axis="root des" func="maxDepth" op="equ" val="1">
+            <dgm:constrLst>
+              <dgm:constr type="w" for="ch" forName="tx1" refType="w"/>
+            </dgm:constrLst>
+          </dgm:if>
+          <dgm:if name="Name9" axis="root des" func="maxDepth" op="equ" val="2">
+            <dgm:constrLst>
+              <dgm:constr type="w" for="ch" forName="tx1" refType="w" fact="0.2"/>
+              <dgm:constr type="w" for="des" forName="tx2" refType="w" fact="0.785"/>
+              <dgm:constr type="w" for="des" forName="horzSpace2" refType="w" fact="0.015"/>
+              <dgm:constr type="w" for="des" forName="thinLine2b" refType="w" fact="0.8"/>
+            </dgm:constrLst>
+          </dgm:if>
+          <dgm:if name="Name10" axis="root des" func="maxDepth" op="equ" val="3">
+            <dgm:constrLst>
+              <dgm:constr type="w" for="ch" forName="tx1" refType="w" fact="0.2"/>
+              <dgm:constr type="w" for="des" forName="tx2" refType="w" fact="0.385"/>
+              <dgm:constr type="w" for="des" forName="tx3" refType="w" fact="0.385"/>
+              <dgm:constr type="w" for="des" forName="horzSpace2" refType="w" fact="0.015"/>
+              <dgm:constr type="w" for="des" forName="horzSpace3" refType="w" fact="0.015"/>
+              <dgm:constr type="w" for="des" forName="thinLine2b" refType="w" fact="0.8"/>
+              <dgm:constr type="w" for="des" forName="thinLine3" refType="w" fact="0.385"/>
+            </dgm:constrLst>
+          </dgm:if>
+          <dgm:if name="Name11" axis="root des" func="maxDepth" op="gte" val="4">
+            <dgm:constrLst>
+              <dgm:constr type="w" for="ch" forName="tx1" refType="w" fact="0.2"/>
+              <dgm:constr type="w" for="des" forName="tx2" refType="w" fact="0.2516"/>
+              <dgm:constr type="w" for="des" forName="tx3" refType="w" fact="0.2516"/>
+              <dgm:constr type="w" for="des" forName="tx4" refType="w" fact="0.2516"/>
+              <dgm:constr type="w" for="des" forName="horzSpace2" refType="w" fact="0.015"/>
+              <dgm:constr type="w" for="des" forName="horzSpace3" refType="w" fact="0.015"/>
+              <dgm:constr type="w" for="des" forName="horzSpace4" refType="w" fact="0.015"/>
+              <dgm:constr type="w" for="des" forName="thinLine2b" refType="w" fact="0.8"/>
+              <dgm:constr type="w" for="des" forName="thinLine3" refType="w" fact="0.5332"/>
+            </dgm:constrLst>
+          </dgm:if>
+          <dgm:else name="Name12"/>
+        </dgm:choose>
+        <dgm:layoutNode name="tx1" styleLbl="revTx">
+          <dgm:alg type="tx">
+            <dgm:param type="parTxLTRAlign" val="l"/>
+            <dgm:param type="parTxRTLAlign" val="r"/>
+            <dgm:param type="txAnchorVert" val="t"/>
+          </dgm:alg>
+          <dgm:shape xmlns:r="http://schemas.openxmlformats.org/officeDocument/2006/relationships" type="rect" r:blip="">
+            <dgm:adjLst/>
+          </dgm:shape>
+          <dgm:presOf axis="self"/>
+          <dgm:constrLst>
+            <dgm:constr type="tMarg" refType="primFontSz" fact="0.3"/>
+            <dgm:constr type="bMarg" refType="primFontSz" fact="0.3"/>
+            <dgm:constr type="lMarg" refType="primFontSz" fact="0.3"/>
+            <dgm:constr type="rMarg" refType="primFontSz" fact="0.3"/>
+          </dgm:constrLst>
+          <dgm:ruleLst>
+            <dgm:rule type="primFontSz" val="5" fact="NaN" max="NaN"/>
+          </dgm:ruleLst>
+        </dgm:layoutNode>
+        <dgm:layoutNode name="vert1">
+          <dgm:choose name="Name13">
+            <dgm:if name="Name14" func="var" arg="dir" op="equ" val="norm">
+              <dgm:alg type="lin">
+                <dgm:param type="linDir" val="fromT"/>
+                <dgm:param type="nodeHorzAlign" val="l"/>
+              </dgm:alg>
+            </dgm:if>
+            <dgm:else name="Name15">
+              <dgm:alg type="lin">
+                <dgm:param type="linDir" val="fromT"/>
+                <dgm:param type="nodeHorzAlign" val="r"/>
+              </dgm:alg>
+            </dgm:else>
+          </dgm:choose>
+          <dgm:shape xmlns:r="http://schemas.openxmlformats.org/officeDocument/2006/relationships" r:blip="">
+            <dgm:adjLst/>
+          </dgm:shape>
+          <dgm:presOf/>
+          <dgm:forEach name="Name16" axis="ch" ptType="node">
+            <dgm:choose name="Name17">
+              <dgm:if name="Name18" axis="self" ptType="node" func="pos" op="equ" val="1">
+                <dgm:layoutNode name="vertSpace2a">
+                  <dgm:alg type="sp"/>
+                  <dgm:shape xmlns:r="http://schemas.openxmlformats.org/officeDocument/2006/relationships" r:blip="">
+                    <dgm:adjLst/>
+                  </dgm:shape>
+                  <dgm:presOf/>
+                </dgm:layoutNode>
+              </dgm:if>
+              <dgm:else name="Name19"/>
+            </dgm:choose>
+            <dgm:layoutNode name="horz2">
+              <dgm:choose name="Name20">
+                <dgm:if name="Name21" func="var" arg="dir" op="equ" val="norm">
+                  <dgm:alg type="lin">
+                    <dgm:param type="linDir" val="fromL"/>
+                    <dgm:param type="nodeVertAlign" val="t"/>
+                  </dgm:alg>
+                </dgm:if>
+                <dgm:else name="Name22">
+                  <dgm:alg type="lin">
+                    <dgm:param type="linDir" val="fromR"/>
+                    <dgm:param type="nodeVertAlign" val="t"/>
+                  </dgm:alg>
+                </dgm:else>
+              </dgm:choose>
+              <dgm:shape xmlns:r="http://schemas.openxmlformats.org/officeDocument/2006/relationships" r:blip="">
+                <dgm:adjLst/>
+              </dgm:shape>
+              <dgm:presOf/>
+              <dgm:layoutNode name="horzSpace2">
+                <dgm:alg type="sp"/>
+                <dgm:shape xmlns:r="http://schemas.openxmlformats.org/officeDocument/2006/relationships" r:blip="">
+                  <dgm:adjLst/>
+                </dgm:shape>
+                <dgm:presOf/>
+              </dgm:layoutNode>
+              <dgm:layoutNode name="tx2" styleLbl="revTx">
+                <dgm:alg type="tx">
+                  <dgm:param type="parTxLTRAlign" val="l"/>
+                  <dgm:param type="parTxRTLAlign" val="r"/>
+                  <dgm:param type="txAnchorVert" val="t"/>
+                </dgm:alg>
+                <dgm:shape xmlns:r="http://schemas.openxmlformats.org/officeDocument/2006/relationships" type="rect" r:blip="">
+                  <dgm:adjLst/>
+                </dgm:shape>
+                <dgm:presOf axis="self"/>
+                <dgm:constrLst>
+                  <dgm:constr type="tMarg" refType="primFontSz" fact="0.3"/>
+                  <dgm:constr type="bMarg" refType="primFontSz" fact="0.3"/>
+                  <dgm:constr type="lMarg" refType="primFontSz" fact="0.3"/>
+                  <dgm:constr type="rMarg" refType="primFontSz" fact="0.3"/>
+                </dgm:constrLst>
+                <dgm:ruleLst>
+                  <dgm:rule type="primFontSz" val="5" fact="NaN" max="NaN"/>
+                </dgm:ruleLst>
+              </dgm:layoutNode>
+              <dgm:layoutNode name="vert2">
+                <dgm:choose name="Name23">
+                  <dgm:if name="Name24" func="var" arg="dir" op="equ" val="norm">
+                    <dgm:alg type="lin">
+                      <dgm:param type="linDir" val="fromT"/>
+                      <dgm:param type="nodeHorzAlign" val="l"/>
+                    </dgm:alg>
+                  </dgm:if>
+                  <dgm:else name="Name25">
+                    <dgm:alg type="lin">
+                      <dgm:param type="linDir" val="fromT"/>
+                      <dgm:param type="nodeHorzAlign" val="r"/>
+                    </dgm:alg>
+                  </dgm:else>
+                </dgm:choose>
+                <dgm:shape xmlns:r="http://schemas.openxmlformats.org/officeDocument/2006/relationships" r:blip="">
+                  <dgm:adjLst/>
+                </dgm:shape>
+                <dgm:presOf/>
+                <dgm:forEach name="Name26" axis="ch" ptType="node">
+                  <dgm:layoutNode name="horz3">
+                    <dgm:choose name="Name27">
+                      <dgm:if name="Name28" func="var" arg="dir" op="equ" val="norm">
+                        <dgm:alg type="lin">
+                          <dgm:param type="linDir" val="fromL"/>
+                          <dgm:param type="nodeVertAlign" val="t"/>
+                        </dgm:alg>
+                      </dgm:if>
+                      <dgm:else name="Name29">
+                        <dgm:alg type="lin">
+                          <dgm:param type="linDir" val="fromR"/>
+                          <dgm:param type="nodeVertAlign" val="t"/>
+                        </dgm:alg>
+                      </dgm:else>
+                    </dgm:choose>
+                    <dgm:shape xmlns:r="http://schemas.openxmlformats.org/officeDocument/2006/relationships" r:blip="">
+                      <dgm:adjLst/>
+                    </dgm:shape>
+                    <dgm:presOf/>
+                    <dgm:layoutNode name="horzSpace3">
+                      <dgm:alg type="sp"/>
+                      <dgm:shape xmlns:r="http://schemas.openxmlformats.org/officeDocument/2006/relationships" r:blip="">
+                        <dgm:adjLst/>
+                      </dgm:shape>
+                      <dgm:presOf/>
+                    </dgm:layoutNode>
+                    <dgm:layoutNode name="tx3" styleLbl="revTx">
+                      <dgm:alg type="tx">
+                        <dgm:param type="parTxLTRAlign" val="l"/>
+                        <dgm:param type="parTxRTLAlign" val="r"/>
+                        <dgm:param type="txAnchorVert" val="t"/>
+                      </dgm:alg>
+                      <dgm:shape xmlns:r="http://schemas.openxmlformats.org/officeDocument/2006/relationships" type="rect" r:blip="">
+                        <dgm:adjLst/>
+                      </dgm:shape>
+                      <dgm:presOf axis="self"/>
+                      <dgm:constrLst>
+                        <dgm:constr type="tMarg" refType="primFontSz" fact="0.3"/>
+                        <dgm:constr type="bMarg" refType="primFontSz" fact="0.3"/>
+                        <dgm:constr type="lMarg" refType="primFontSz" fact="0.3"/>
+                        <dgm:constr type="rMarg" refType="primFontSz" fact="0.3"/>
+                      </dgm:constrLst>
+                      <dgm:ruleLst>
+                        <dgm:rule type="primFontSz" val="5" fact="NaN" max="NaN"/>
+                      </dgm:ruleLst>
+                    </dgm:layoutNode>
+                    <dgm:layoutNode name="vert3">
+                      <dgm:choose name="Name30">
+                        <dgm:if name="Name31" func="var" arg="dir" op="equ" val="norm">
+                          <dgm:alg type="lin">
+                            <dgm:param type="linDir" val="fromT"/>
+                            <dgm:param type="nodeHorzAlign" val="l"/>
+                          </dgm:alg>
+                        </dgm:if>
+                        <dgm:else name="Name32">
+                          <dgm:alg type="lin">
+                            <dgm:param type="linDir" val="fromT"/>
+                            <dgm:param type="nodeHorzAlign" val="r"/>
+                          </dgm:alg>
+                        </dgm:else>
+                      </dgm:choose>
+                      <dgm:shape xmlns:r="http://schemas.openxmlformats.org/officeDocument/2006/relationships" r:blip="">
+                        <dgm:adjLst/>
+                      </dgm:shape>
+                      <dgm:presOf/>
+                      <dgm:forEach name="Name33" axis="ch" ptType="node">
+                        <dgm:layoutNode name="horz4">
+                          <dgm:choose name="Name34">
+                            <dgm:if name="Name35" func="var" arg="dir" op="equ" val="norm">
+                              <dgm:alg type="lin">
+                                <dgm:param type="linDir" val="fromL"/>
+                                <dgm:param type="nodeVertAlign" val="t"/>
+                              </dgm:alg>
+                            </dgm:if>
+                            <dgm:else name="Name36">
+                              <dgm:alg type="lin">
+                                <dgm:param type="linDir" val="fromR"/>
+                                <dgm:param type="nodeVertAlign" val="t"/>
+                              </dgm:alg>
+                            </dgm:else>
+                          </dgm:choose>
+                          <dgm:shape xmlns:r="http://schemas.openxmlformats.org/officeDocument/2006/relationships" r:blip="">
+                            <dgm:adjLst/>
+                          </dgm:shape>
+                          <dgm:presOf/>
+                          <dgm:layoutNode name="horzSpace4">
+                            <dgm:alg type="sp"/>
+                            <dgm:shape xmlns:r="http://schemas.openxmlformats.org/officeDocument/2006/relationships" r:blip="">
+                              <dgm:adjLst/>
+                            </dgm:shape>
+                            <dgm:presOf/>
+                          </dgm:layoutNode>
+                          <dgm:layoutNode name="tx4" styleLbl="revTx">
+                            <dgm:varLst>
+                              <dgm:bulletEnabled val="1"/>
+                            </dgm:varLst>
+                            <dgm:alg type="tx">
+                              <dgm:param type="parTxLTRAlign" val="l"/>
+                              <dgm:param type="parTxRTLAlign" val="r"/>
+                              <dgm:param type="txAnchorVert" val="t"/>
+                            </dgm:alg>
+                            <dgm:shape xmlns:r="http://schemas.openxmlformats.org/officeDocument/2006/relationships" type="rect" r:blip="">
+                              <dgm:adjLst/>
+                            </dgm:shape>
+                            <dgm:presOf axis="desOrSelf" ptType="node"/>
+                            <dgm:constrLst>
+                              <dgm:constr type="tMarg" refType="primFontSz" fact="0.3"/>
+                              <dgm:constr type="bMarg" refType="primFontSz" fact="0.3"/>
+                              <dgm:constr type="lMarg" refType="primFontSz" fact="0.3"/>
+                              <dgm:constr type="rMarg" refType="primFontSz" fact="0.3"/>
+                            </dgm:constrLst>
+                            <dgm:ruleLst>
+                              <dgm:rule type="primFontSz" val="5" fact="NaN" max="NaN"/>
+                            </dgm:ruleLst>
+                          </dgm:layoutNode>
+                        </dgm:layoutNode>
+                      </dgm:forEach>
+                    </dgm:layoutNode>
+                  </dgm:layoutNode>
+                  <dgm:forEach name="Name37" axis="followSib" ptType="sibTrans" cnt="1">
+                    <dgm:layoutNode name="thinLine3" styleLbl="callout">
+                      <dgm:alg type="sp"/>
+                      <dgm:shape xmlns:r="http://schemas.openxmlformats.org/officeDocument/2006/relationships" type="line" r:blip="">
+                        <dgm:adjLst/>
+                      </dgm:shape>
+                      <dgm:presOf/>
+                    </dgm:layoutNode>
+                  </dgm:forEach>
+                </dgm:forEach>
+              </dgm:layoutNode>
+            </dgm:layoutNode>
+            <dgm:layoutNode name="thinLine2b" styleLbl="callout">
+              <dgm:alg type="sp"/>
+              <dgm:shape xmlns:r="http://schemas.openxmlformats.org/officeDocument/2006/relationships" type="line" r:blip="">
+                <dgm:adjLst/>
+              </dgm:shape>
+              <dgm:presOf/>
+            </dgm:layoutNode>
+            <dgm:layoutNode name="vertSpace2b">
+              <dgm:alg type="sp"/>
+              <dgm:shape xmlns:r="http://schemas.openxmlformats.org/officeDocument/2006/relationships" r:blip="">
+                <dgm:adjLst/>
+              </dgm:shape>
+              <dgm:presOf/>
+            </dgm:layoutNode>
+          </dgm:forEach>
+        </dgm:layoutNode>
+      </dgm:layoutNode>
+    </dgm:forEach>
+  </dgm:layoutNode>
+</dgm:layoutDef>
+</file>
+
+<file path=ppt/diagrams/quickStyle1.xml><?xml version="1.0" encoding="utf-8"?>
+<dgm:styleDef xmlns:dgm="http://schemas.openxmlformats.org/drawingml/2006/diagram" xmlns:a="http://schemas.openxmlformats.org/drawingml/2006/main" uniqueId="urn:microsoft.com/office/officeart/2005/8/quickstyle/simple1">
+  <dgm:title val=""/>
+  <dgm:desc val=""/>
+  <dgm:catLst>
+    <dgm:cat type="simple" pri="10100"/>
+  </dgm:catLst>
+  <dgm:scene3d>
+    <a:camera prst="orthographicFront"/>
+    <a:lightRig rig="threePt" dir="t"/>
+  </dgm:scene3d>
+  <dgm:styleLbl name="node0">
+    <dgm:scene3d>
+      <a:camera prst="orthographicFront"/>
+      <a:lightRig rig="threePt" dir="t"/>
+    </dgm:scene3d>
+    <dgm:sp3d/>
+    <dgm:txPr/>
+    <dgm:style>
+      <a:lnRef idx="2">
+        <a:scrgbClr r="0" g="0" b="0"/>
+      </a:lnRef>
+      <a:fillRef idx="1">
+        <a:scrgbClr r="0" g="0" b="0"/>
+      </a:fillRef>
+      <a:effectRef idx="0">
+        <a:scrgbClr r="0" g="0" b="0"/>
+      </a:effectRef>
+      <a:fontRef idx="minor">
+        <a:schemeClr val="lt1"/>
+      </a:fontRef>
+    </dgm:style>
+  </dgm:styleLbl>
+  <dgm:styleLbl name="lnNode1">
+    <dgm:scene3d>
+      <a:camera prst="orthographicFront"/>
+      <a:lightRig rig="threePt" dir="t"/>
+    </dgm:scene3d>
+    <dgm:sp3d/>
+    <dgm:txPr/>
+    <dgm:style>
+      <a:lnRef idx="2">
+        <a:scrgbClr r="0" g="0" b="0"/>
+      </a:lnRef>
+      <a:fillRef idx="1">
+        <a:scrgbClr r="0" g="0" b="0"/>
+      </a:fillRef>
+      <a:effectRef idx="0">
+        <a:scrgbClr r="0" g="0" b="0"/>
+      </a:effectRef>
+      <a:fontRef idx="minor">
+        <a:schemeClr val="lt1"/>
+      </a:fontRef>
+    </dgm:style>
+  </dgm:styleLbl>
+  <dgm:styleLbl name="vennNode1">
+    <dgm:scene3d>
+      <a:camera prst="orthographicFront"/>
+      <a:lightRig rig="threePt" dir="t"/>
+    </dgm:scene3d>
+    <dgm:sp3d/>
+    <dgm:txPr/>
+    <dgm:style>
+      <a:lnRef idx="2">
+        <a:scrgbClr r="0" g="0" b="0"/>
+      </a:lnRef>
+      <a:fillRef idx="1">
+        <a:scrgbClr r="0" g="0" b="0"/>
+      </a:fillRef>
+      <a:effectRef idx="0">
+        <a:scrgbClr r="0" g="0" b="0"/>
+      </a:effectRef>
+      <a:fontRef idx="minor">
+        <a:schemeClr val="tx1"/>
+      </a:fontRef>
+    </dgm:style>
+  </dgm:styleLbl>
+  <dgm:styleLbl name="alignNode1">
+    <dgm:scene3d>
+      <a:camera prst="orthographicFront"/>
+      <a:lightRig rig="threePt" dir="t"/>
+    </dgm:scene3d>
+    <dgm:sp3d/>
+    <dgm:txPr/>
+    <dgm:style>
+      <a:lnRef idx="2">
+        <a:scrgbClr r="0" g="0" b="0"/>
+      </a:lnRef>
+      <a:fillRef idx="1">
+        <a:scrgbClr r="0" g="0" b="0"/>
+      </a:fillRef>
+      <a:effectRef idx="0">
+        <a:scrgbClr r="0" g="0" b="0"/>
+      </a:effectRef>
+      <a:fontRef idx="minor">
+        <a:schemeClr val="lt1"/>
+      </a:fontRef>
+    </dgm:style>
+  </dgm:styleLbl>
+  <dgm:styleLbl name="node1">
+    <dgm:scene3d>
+      <a:camera prst="orthographicFront"/>
+      <a:lightRig rig="threePt" dir="t"/>
+    </dgm:scene3d>
+    <dgm:sp3d/>
+    <dgm:txPr/>
+    <dgm:style>
+      <a:lnRef idx="2">
+        <a:scrgbClr r="0" g="0" b="0"/>
+      </a:lnRef>
+      <a:fillRef idx="1">
+        <a:scrgbClr r="0" g="0" b="0"/>
+      </a:fillRef>
+      <a:effectRef idx="0">
+        <a:scrgbClr r="0" g="0" b="0"/>
+      </a:effectRef>
+      <a:fontRef idx="minor">
+        <a:schemeClr val="lt1"/>
+      </a:fontRef>
+    </dgm:style>
+  </dgm:styleLbl>
+  <dgm:styleLbl name="node2">
+    <dgm:scene3d>
+      <a:camera prst="orthographicFront"/>
+      <a:lightRig rig="threePt" dir="t"/>
+    </dgm:scene3d>
+    <dgm:sp3d/>
+    <dgm:txPr/>
+    <dgm:style>
+      <a:lnRef idx="2">
+        <a:scrgbClr r="0" g="0" b="0"/>
+      </a:lnRef>
+      <a:fillRef idx="1">
+        <a:scrgbClr r="0" g="0" b="0"/>
+      </a:fillRef>
+      <a:effectRef idx="0">
+        <a:scrgbClr r="0" g="0" b="0"/>
+      </a:effectRef>
+      <a:fontRef idx="minor">
+        <a:schemeClr val="lt1"/>
+      </a:fontRef>
+    </dgm:style>
+  </dgm:styleLbl>
+  <dgm:styleLbl name="node3">
+    <dgm:scene3d>
+      <a:camera prst="orthographicFront"/>
+      <a:lightRig rig="threePt" dir="t"/>
+    </dgm:scene3d>
+    <dgm:sp3d/>
+    <dgm:txPr/>
+    <dgm:style>
+      <a:lnRef idx="2">
+        <a:scrgbClr r="0" g="0" b="0"/>
+      </a:lnRef>
+      <a:fillRef idx="1">
+        <a:scrgbClr r="0" g="0" b="0"/>
+      </a:fillRef>
+      <a:effectRef idx="0">
+        <a:scrgbClr r="0" g="0" b="0"/>
+      </a:effectRef>
+      <a:fontRef idx="minor">
+        <a:schemeClr val="lt1"/>
+      </a:fontRef>
+    </dgm:style>
+  </dgm:styleLbl>
+  <dgm:styleLbl name="node4">
+    <dgm:scene3d>
+      <a:camera prst="orthographicFront"/>
+      <a:lightRig rig="threePt" dir="t"/>
+    </dgm:scene3d>
+    <dgm:sp3d/>
+    <dgm:txPr/>
+    <dgm:style>
+      <a:lnRef idx="2">
+        <a:scrgbClr r="0" g="0" b="0"/>
+      </a:lnRef>
+      <a:fillRef idx="1">
+        <a:scrgbClr r="0" g="0" b="0"/>
+      </a:fillRef>
+      <a:effectRef idx="0">
+        <a:scrgbClr r="0" g="0" b="0"/>
+      </a:effectRef>
+      <a:fontRef idx="minor">
+        <a:schemeClr val="lt1"/>
+      </a:fontRef>
+    </dgm:style>
+  </dgm:styleLbl>
+  <dgm:styleLbl name="fgImgPlace1">
+    <dgm:scene3d>
+      <a:camera prst="orthographicFront"/>
+      <a:lightRig rig="threePt" dir="t"/>
+    </dgm:scene3d>
+    <dgm:sp3d/>
+    <dgm:txPr/>
+    <dgm:style>
+      <a:lnRef idx="2">
+        <a:scrgbClr r="0" g="0" b="0"/>
+      </a:lnRef>
+      <a:fillRef idx="1">
+        <a:scrgbClr r="0" g="0" b="0"/>
+      </a:fillRef>
+      <a:effectRef idx="0">
+        <a:scrgbClr r="0" g="0" b="0"/>
+      </a:effectRef>
+      <a:fontRef idx="minor"/>
+    </dgm:style>
+  </dgm:styleLbl>
+  <dgm:styleLbl name="alignImgPlace1">
+    <dgm:scene3d>
+      <a:camera prst="orthographicFront"/>
+      <a:lightRig rig="threePt" dir="t"/>
+    </dgm:scene3d>
+    <dgm:sp3d/>
+    <dgm:txPr/>
+    <dgm:style>
+      <a:lnRef idx="2">
+        <a:scrgbClr r="0" g="0" b="0"/>
+      </a:lnRef>
+      <a:fillRef idx="1">
+        <a:scrgbClr r="0" g="0" b="0"/>
+      </a:fillRef>
+      <a:effectRef idx="0">
+        <a:scrgbClr r="0" g="0" b="0"/>
+      </a:effectRef>
+      <a:fontRef idx="minor"/>
+    </dgm:style>
+  </dgm:styleLbl>
+  <dgm:styleLbl name="bgImgPlace1">
+    <dgm:scene3d>
+      <a:camera prst="orthographicFront"/>
+      <a:lightRig rig="threePt" dir="t"/>
+    </dgm:scene3d>
+    <dgm:sp3d/>
+    <dgm:txPr/>
+    <dgm:style>
+      <a:lnRef idx="2">
+        <a:scrgbClr r="0" g="0" b="0"/>
+      </a:lnRef>
+      <a:fillRef idx="1">
+        <a:scrgbClr r="0" g="0" b="0"/>
+      </a:fillRef>
+      <a:effectRef idx="0">
+        <a:scrgbClr r="0" g="0" b="0"/>
+      </a:effectRef>
+      <a:fontRef idx="minor"/>
+    </dgm:style>
+  </dgm:styleLbl>
+  <dgm:styleLbl name="sibTrans2D1">
+    <dgm:scene3d>
+      <a:camera prst="orthographicFront"/>
+      <a:lightRig rig="threePt" dir="t"/>
+    </dgm:scene3d>
+    <dgm:sp3d/>
+    <dgm:txPr/>
+    <dgm:style>
+      <a:lnRef idx="0">
+        <a:scrgbClr r="0" g="0" b="0"/>
+      </a:lnRef>
+      <a:fillRef idx="1">
+        <a:scrgbClr r="0" g="0" b="0"/>
+      </a:fillRef>
+      <a:effectRef idx="0">
+        <a:scrgbClr r="0" g="0" b="0"/>
+      </a:effectRef>
+      <a:fontRef idx="minor">
+        <a:schemeClr val="lt1"/>
+      </a:fontRef>
+    </dgm:style>
+  </dgm:styleLbl>
+  <dgm:styleLbl name="fgSibTrans2D1">
+    <dgm:scene3d>
+      <a:camera prst="orthographicFront"/>
+      <a:lightRig rig="threePt" dir="t"/>
+    </dgm:scene3d>
+    <dgm:sp3d/>
+    <dgm:txPr/>
+    <dgm:style>
+      <a:lnRef idx="0">
+        <a:scrgbClr r="0" g="0" b="0"/>
+      </a:lnRef>
+      <a:fillRef idx="1">
+        <a:scrgbClr r="0" g="0" b="0"/>
+      </a:fillRef>
+      <a:effectRef idx="0">
+        <a:scrgbClr r="0" g="0" b="0"/>
+      </a:effectRef>
+      <a:fontRef idx="minor">
+        <a:schemeClr val="lt1"/>
+      </a:fontRef>
+    </dgm:style>
+  </dgm:styleLbl>
+  <dgm:styleLbl name="bgSibTrans2D1">
+    <dgm:scene3d>
+      <a:camera prst="orthographicFront"/>
+      <a:lightRig rig="threePt" dir="t"/>
+    </dgm:scene3d>
+    <dgm:sp3d/>
+    <dgm:txPr/>
+    <dgm:style>
+      <a:lnRef idx="0">
+        <a:scrgbClr r="0" g="0" b="0"/>
+      </a:lnRef>
+      <a:fillRef idx="1">
+        <a:scrgbClr r="0" g="0" b="0"/>
+      </a:fillRef>
+      <a:effectRef idx="0">
+        <a:scrgbClr r="0" g="0" b="0"/>
+      </a:effectRef>
+      <a:fontRef idx="minor">
+        <a:schemeClr val="lt1"/>
+      </a:fontRef>
+    </dgm:style>
+  </dgm:styleLbl>
+  <dgm:styleLbl name="sibTrans1D1">
+    <dgm:scene3d>
+      <a:camera prst="orthographicFront"/>
+      <a:lightRig rig="threePt" dir="t"/>
+    </dgm:scene3d>
+    <dgm:sp3d/>
+    <dgm:txPr/>
+    <dgm:style>
+      <a:lnRef idx="1">
+        <a:scrgbClr r="0" g="0" b="0"/>
+      </a:lnRef>
+      <a:fillRef idx="0">
+        <a:scrgbClr r="0" g="0" b="0"/>
+      </a:fillRef>
+      <a:effectRef idx="0">
+        <a:scrgbClr r="0" g="0" b="0"/>
+      </a:effectRef>
+      <a:fontRef idx="minor"/>
+    </dgm:style>
+  </dgm:styleLbl>
+  <dgm:styleLbl name="callout">
+    <dgm:scene3d>
+      <a:camera prst="orthographicFront"/>
+      <a:lightRig rig="threePt" dir="t"/>
+    </dgm:scene3d>
+    <dgm:sp3d/>
+    <dgm:txPr/>
+    <dgm:style>
+      <a:lnRef idx="2">
+        <a:scrgbClr r="0" g="0" b="0"/>
+      </a:lnRef>
+      <a:fillRef idx="1">
+        <a:scrgbClr r="0" g="0" b="0"/>
+      </a:fillRef>
+      <a:effectRef idx="0">
+        <a:scrgbClr r="0" g="0" b="0"/>
+      </a:effectRef>
+      <a:fontRef idx="minor"/>
+    </dgm:style>
+  </dgm:styleLbl>
+  <dgm:styleLbl name="asst0">
+    <dgm:scene3d>
+      <a:camera prst="orthographicFront"/>
+      <a:lightRig rig="threePt" dir="t"/>
+    </dgm:scene3d>
+    <dgm:sp3d/>
+    <dgm:txPr/>
+    <dgm:style>
+      <a:lnRef idx="2">
+        <a:scrgbClr r="0" g="0" b="0"/>
+      </a:lnRef>
+      <a:fillRef idx="1">
+        <a:scrgbClr r="0" g="0" b="0"/>
+      </a:fillRef>
+      <a:effectRef idx="0">
+        <a:scrgbClr r="0" g="0" b="0"/>
+      </a:effectRef>
+      <a:fontRef idx="minor">
+        <a:schemeClr val="lt1"/>
+      </a:fontRef>
+    </dgm:style>
+  </dgm:styleLbl>
+  <dgm:styleLbl name="asst1">
+    <dgm:scene3d>
+      <a:camera prst="orthographicFront"/>
+      <a:lightRig rig="threePt" dir="t"/>
+    </dgm:scene3d>
+    <dgm:sp3d/>
+    <dgm:txPr/>
+    <dgm:style>
+      <a:lnRef idx="2">
+        <a:scrgbClr r="0" g="0" b="0"/>
+      </a:lnRef>
+      <a:fillRef idx="1">
+        <a:scrgbClr r="0" g="0" b="0"/>
+      </a:fillRef>
+      <a:effectRef idx="0">
+        <a:scrgbClr r="0" g="0" b="0"/>
+      </a:effectRef>
+      <a:fontRef idx="minor">
+        <a:schemeClr val="lt1"/>
+      </a:fontRef>
+    </dgm:style>
+  </dgm:styleLbl>
+  <dgm:styleLbl name="asst2">
+    <dgm:scene3d>
+      <a:camera prst="orthographicFront"/>
+      <a:lightRig rig="threePt" dir="t"/>
+    </dgm:scene3d>
+    <dgm:sp3d/>
+    <dgm:txPr/>
+    <dgm:style>
+      <a:lnRef idx="2">
+        <a:scrgbClr r="0" g="0" b="0"/>
+      </a:lnRef>
+      <a:fillRef idx="1">
+        <a:scrgbClr r="0" g="0" b="0"/>
+      </a:fillRef>
+      <a:effectRef idx="0">
+        <a:scrgbClr r="0" g="0" b="0"/>
+      </a:effectRef>
+      <a:fontRef idx="minor">
+        <a:schemeClr val="lt1"/>
+      </a:fontRef>
+    </dgm:style>
+  </dgm:styleLbl>
+  <dgm:styleLbl name="asst3">
+    <dgm:scene3d>
+      <a:camera prst="orthographicFront"/>
+      <a:lightRig rig="threePt" dir="t"/>
+    </dgm:scene3d>
+    <dgm:sp3d/>
+    <dgm:txPr/>
+    <dgm:style>
+      <a:lnRef idx="2">
+        <a:scrgbClr r="0" g="0" b="0"/>
+      </a:lnRef>
+      <a:fillRef idx="1">
+        <a:scrgbClr r="0" g="0" b="0"/>
+      </a:fillRef>
+      <a:effectRef idx="0">
+        <a:scrgbClr r="0" g="0" b="0"/>
+      </a:effectRef>
+      <a:fontRef idx="minor">
+        <a:schemeClr val="lt1"/>
+      </a:fontRef>
+    </dgm:style>
+  </dgm:styleLbl>
+  <dgm:styleLbl name="asst4">
+    <dgm:scene3d>
+      <a:camera prst="orthographicFront"/>
+      <a:lightRig rig="threePt" dir="t"/>
+    </dgm:scene3d>
+    <dgm:sp3d/>
+    <dgm:txPr/>
+    <dgm:style>
+      <a:lnRef idx="2">
+        <a:scrgbClr r="0" g="0" b="0"/>
+      </a:lnRef>
+      <a:fillRef idx="1">
+        <a:scrgbClr r="0" g="0" b="0"/>
+      </a:fillRef>
+      <a:effectRef idx="0">
+        <a:scrgbClr r="0" g="0" b="0"/>
+      </a:effectRef>
+      <a:fontRef idx="minor">
+        <a:schemeClr val="lt1"/>
+      </a:fontRef>
+    </dgm:style>
+  </dgm:styleLbl>
+  <dgm:styleLbl name="parChTrans2D1">
+    <dgm:scene3d>
+      <a:camera prst="orthographicFront"/>
+      <a:lightRig rig="threePt" dir="t"/>
+    </dgm:scene3d>
+    <dgm:sp3d/>
+    <dgm:txPr/>
+    <dgm:style>
+      <a:lnRef idx="2">
+        <a:scrgbClr r="0" g="0" b="0"/>
+      </a:lnRef>
+      <a:fillRef idx="1">
+        <a:scrgbClr r="0" g="0" b="0"/>
+      </a:fillRef>
+      <a:effectRef idx="0">
+        <a:scrgbClr r="0" g="0" b="0"/>
+      </a:effectRef>
+      <a:fontRef idx="minor">
+        <a:schemeClr val="lt1"/>
+      </a:fontRef>
+    </dgm:style>
+  </dgm:styleLbl>
+  <dgm:styleLbl name="parChTrans2D2">
+    <dgm:scene3d>
+      <a:camera prst="orthographicFront"/>
+      <a:lightRig rig="threePt" dir="t"/>
+    </dgm:scene3d>
+    <dgm:sp3d/>
+    <dgm:txPr/>
+    <dgm:style>
+      <a:lnRef idx="2">
+        <a:scrgbClr r="0" g="0" b="0"/>
+      </a:lnRef>
+      <a:fillRef idx="1">
+        <a:scrgbClr r="0" g="0" b="0"/>
+      </a:fillRef>
+      <a:effectRef idx="0">
+        <a:scrgbClr r="0" g="0" b="0"/>
+      </a:effectRef>
+      <a:fontRef idx="minor">
+        <a:schemeClr val="lt1"/>
+      </a:fontRef>
+    </dgm:style>
+  </dgm:styleLbl>
+  <dgm:styleLbl name="parChTrans2D3">
+    <dgm:scene3d>
+      <a:camera prst="orthographicFront"/>
+      <a:lightRig rig="threePt" dir="t"/>
+    </dgm:scene3d>
+    <dgm:sp3d/>
+    <dgm:txPr/>
+    <dgm:style>
+      <a:lnRef idx="2">
+        <a:scrgbClr r="0" g="0" b="0"/>
+      </a:lnRef>
+      <a:fillRef idx="1">
+        <a:scrgbClr r="0" g="0" b="0"/>
+      </a:fillRef>
+      <a:effectRef idx="0">
+        <a:scrgbClr r="0" g="0" b="0"/>
+      </a:effectRef>
+      <a:fontRef idx="minor">
+        <a:schemeClr val="lt1"/>
+      </a:fontRef>
+    </dgm:style>
+  </dgm:styleLbl>
+  <dgm:styleLbl name="parChTrans2D4">
+    <dgm:scene3d>
+      <a:camera prst="orthographicFront"/>
+      <a:lightRig rig="threePt" dir="t"/>
+    </dgm:scene3d>
+    <dgm:sp3d/>
+    <dgm:txPr/>
+    <dgm:style>
+      <a:lnRef idx="2">
+        <a:scrgbClr r="0" g="0" b="0"/>
+      </a:lnRef>
+      <a:fillRef idx="1">
+        <a:scrgbClr r="0" g="0" b="0"/>
+      </a:fillRef>
+      <a:effectRef idx="0">
+        <a:scrgbClr r="0" g="0" b="0"/>
+      </a:effectRef>
+      <a:fontRef idx="minor">
+        <a:schemeClr val="lt1"/>
+      </a:fontRef>
+    </dgm:style>
+  </dgm:styleLbl>
+  <dgm:styleLbl name="parChTrans1D1">
+    <dgm:scene3d>
+      <a:camera prst="orthographicFront"/>
+      <a:lightRig rig="threePt" dir="t"/>
+    </dgm:scene3d>
+    <dgm:sp3d/>
+    <dgm:txPr/>
+    <dgm:style>
+      <a:lnRef idx="2">
+        <a:scrgbClr r="0" g="0" b="0"/>
+      </a:lnRef>
+      <a:fillRef idx="0">
+        <a:scrgbClr r="0" g="0" b="0"/>
+      </a:fillRef>
+      <a:effectRef idx="0">
+        <a:scrgbClr r="0" g="0" b="0"/>
+      </a:effectRef>
+      <a:fontRef idx="minor"/>
+    </dgm:style>
+  </dgm:styleLbl>
+  <dgm:styleLbl name="parChTrans1D2">
+    <dgm:scene3d>
+      <a:camera prst="orthographicFront"/>
+      <a:lightRig rig="threePt" dir="t"/>
+    </dgm:scene3d>
+    <dgm:sp3d/>
+    <dgm:txPr/>
+    <dgm:style>
+      <a:lnRef idx="2">
+        <a:scrgbClr r="0" g="0" b="0"/>
+      </a:lnRef>
+      <a:fillRef idx="0">
+        <a:scrgbClr r="0" g="0" b="0"/>
+      </a:fillRef>
+      <a:effectRef idx="0">
+        <a:scrgbClr r="0" g="0" b="0"/>
+      </a:effectRef>
+      <a:fontRef idx="minor"/>
+    </dgm:style>
+  </dgm:styleLbl>
+  <dgm:styleLbl name="parChTrans1D3">
+    <dgm:scene3d>
+      <a:camera prst="orthographicFront"/>
+      <a:lightRig rig="threePt" dir="t"/>
+    </dgm:scene3d>
+    <dgm:sp3d/>
+    <dgm:txPr/>
+    <dgm:style>
+      <a:lnRef idx="2">
+        <a:scrgbClr r="0" g="0" b="0"/>
+      </a:lnRef>
+      <a:fillRef idx="0">
+        <a:scrgbClr r="0" g="0" b="0"/>
+      </a:fillRef>
+      <a:effectRef idx="0">
+        <a:scrgbClr r="0" g="0" b="0"/>
+      </a:effectRef>
+      <a:fontRef idx="minor"/>
+    </dgm:style>
+  </dgm:styleLbl>
+  <dgm:styleLbl name="parChTrans1D4">
+    <dgm:scene3d>
+      <a:camera prst="orthographicFront"/>
+      <a:lightRig rig="threePt" dir="t"/>
+    </dgm:scene3d>
+    <dgm:sp3d/>
+    <dgm:txPr/>
+    <dgm:style>
+      <a:lnRef idx="2">
+        <a:scrgbClr r="0" g="0" b="0"/>
+      </a:lnRef>
+      <a:fillRef idx="0">
+        <a:scrgbClr r="0" g="0" b="0"/>
+      </a:fillRef>
+      <a:effectRef idx="0">
+        <a:scrgbClr r="0" g="0" b="0"/>
+      </a:effectRef>
+      <a:fontRef idx="minor"/>
+    </dgm:style>
+  </dgm:styleLbl>
+  <dgm:styleLbl name="fgAcc1">
+    <dgm:scene3d>
+      <a:camera prst="orthographicFront"/>
+      <a:lightRig rig="threePt" dir="t"/>
+    </dgm:scene3d>
+    <dgm:sp3d/>
+    <dgm:txPr/>
+    <dgm:style>
+      <a:lnRef idx="2">
+        <a:scrgbClr r="0" g="0" b="0"/>
+      </a:lnRef>
+      <a:fillRef idx="1">
+        <a:scrgbClr r="0" g="0" b="0"/>
+      </a:fillRef>
+      <a:effectRef idx="0">
+        <a:scrgbClr r="0" g="0" b="0"/>
+      </a:effectRef>
+      <a:fontRef idx="minor"/>
+    </dgm:style>
+  </dgm:styleLbl>
+  <dgm:styleLbl name="conFgAcc1">
+    <dgm:scene3d>
+      <a:camera prst="orthographicFront"/>
+      <a:lightRig rig="threePt" dir="t"/>
+    </dgm:scene3d>
+    <dgm:sp3d/>
+    <dgm:txPr/>
+    <dgm:style>
+      <a:lnRef idx="2">
+        <a:scrgbClr r="0" g="0" b="0"/>
+      </a:lnRef>
+      <a:fillRef idx="1">
+        <a:scrgbClr r="0" g="0" b="0"/>
+      </a:fillRef>
+      <a:effectRef idx="0">
+        <a:scrgbClr r="0" g="0" b="0"/>
+      </a:effectRef>
+      <a:fontRef idx="minor"/>
+    </dgm:style>
+  </dgm:styleLbl>
+  <dgm:styleLbl name="alignAcc1">
+    <dgm:scene3d>
+      <a:camera prst="orthographicFront"/>
+      <a:lightRig rig="threePt" dir="t"/>
+    </dgm:scene3d>
+    <dgm:sp3d/>
+    <dgm:txPr/>
+    <dgm:style>
+      <a:lnRef idx="2">
+        <a:scrgbClr r="0" g="0" b="0"/>
+      </a:lnRef>
+      <a:fillRef idx="1">
+        <a:scrgbClr r="0" g="0" b="0"/>
+      </a:fillRef>
+      <a:effectRef idx="0">
+        <a:scrgbClr r="0" g="0" b="0"/>
+      </a:effectRef>
+      <a:fontRef idx="minor"/>
+    </dgm:style>
+  </dgm:styleLbl>
+  <dgm:styleLbl name="trAlignAcc1">
+    <dgm:scene3d>
+      <a:camera prst="orthographicFront"/>
+      <a:lightRig rig="threePt" dir="t"/>
+    </dgm:scene3d>
+    <dgm:sp3d/>
+    <dgm:txPr/>
+    <dgm:style>
+      <a:lnRef idx="1">
+        <a:scrgbClr r="0" g="0" b="0"/>
+      </a:lnRef>
+      <a:fillRef idx="1">
+        <a:scrgbClr r="0" g="0" b="0"/>
+      </a:fillRef>
+      <a:effectRef idx="0">
+        <a:scrgbClr r="0" g="0" b="0"/>
+      </a:effectRef>
+      <a:fontRef idx="minor"/>
+    </dgm:style>
+  </dgm:styleLbl>
+  <dgm:styleLbl name="bgAcc1">
+    <dgm:scene3d>
+      <a:camera prst="orthographicFront"/>
+      <a:lightRig rig="threePt" dir="t"/>
+    </dgm:scene3d>
+    <dgm:sp3d/>
+    <dgm:txPr/>
+    <dgm:style>
+      <a:lnRef idx="2">
+        <a:scrgbClr r="0" g="0" b="0"/>
+      </a:lnRef>
+      <a:fillRef idx="1">
+        <a:scrgbClr r="0" g="0" b="0"/>
+      </a:fillRef>
+      <a:effectRef idx="0">
+        <a:scrgbClr r="0" g="0" b="0"/>
+      </a:effectRef>
+      <a:fontRef idx="minor"/>
+    </dgm:style>
+  </dgm:styleLbl>
+  <dgm:styleLbl name="solidFgAcc1">
+    <dgm:scene3d>
+      <a:camera prst="orthographicFront"/>
+      <a:lightRig rig="threePt" dir="t"/>
+    </dgm:scene3d>
+    <dgm:sp3d/>
+    <dgm:txPr/>
+    <dgm:style>
+      <a:lnRef idx="2">
+        <a:scrgbClr r="0" g="0" b="0"/>
+      </a:lnRef>
+      <a:fillRef idx="1">
+        <a:scrgbClr r="0" g="0" b="0"/>
+      </a:fillRef>
+      <a:effectRef idx="0">
+        <a:scrgbClr r="0" g="0" b="0"/>
+      </a:effectRef>
+      <a:fontRef idx="minor"/>
+    </dgm:style>
+  </dgm:styleLbl>
+  <dgm:styleLbl name="solidAlignAcc1">
+    <dgm:scene3d>
+      <a:camera prst="orthographicFront"/>
+      <a:lightRig rig="threePt" dir="t"/>
+    </dgm:scene3d>
+    <dgm:sp3d/>
+    <dgm:txPr/>
+    <dgm:style>
+      <a:lnRef idx="2">
+        <a:scrgbClr r="0" g="0" b="0"/>
+      </a:lnRef>
+      <a:fillRef idx="1">
+        <a:scrgbClr r="0" g="0" b="0"/>
+      </a:fillRef>
+      <a:effectRef idx="0">
+        <a:scrgbClr r="0" g="0" b="0"/>
+      </a:effectRef>
+      <a:fontRef idx="minor"/>
+    </dgm:style>
+  </dgm:styleLbl>
+  <dgm:styleLbl name="solidBgAcc1">
+    <dgm:scene3d>
+      <a:camera prst="orthographicFront"/>
+      <a:lightRig rig="threePt" dir="t"/>
+    </dgm:scene3d>
+    <dgm:sp3d/>
+    <dgm:txPr/>
+    <dgm:style>
+      <a:lnRef idx="2">
+        <a:scrgbClr r="0" g="0" b="0"/>
+      </a:lnRef>
+      <a:fillRef idx="1">
+        <a:scrgbClr r="0" g="0" b="0"/>
+      </a:fillRef>
+      <a:effectRef idx="0">
+        <a:scrgbClr r="0" g="0" b="0"/>
+      </a:effectRef>
+      <a:fontRef idx="minor"/>
+    </dgm:style>
+  </dgm:styleLbl>
+  <dgm:styleLbl name="fgAccFollowNode1">
+    <dgm:scene3d>
+      <a:camera prst="orthographicFront"/>
+      <a:lightRig rig="threePt" dir="t"/>
+    </dgm:scene3d>
+    <dgm:sp3d/>
+    <dgm:txPr/>
+    <dgm:style>
+      <a:lnRef idx="2">
+        <a:scrgbClr r="0" g="0" b="0"/>
+      </a:lnRef>
+      <a:fillRef idx="1">
+        <a:scrgbClr r="0" g="0" b="0"/>
+      </a:fillRef>
+      <a:effectRef idx="0">
+        <a:scrgbClr r="0" g="0" b="0"/>
+      </a:effectRef>
+      <a:fontRef idx="minor"/>
+    </dgm:style>
+  </dgm:styleLbl>
+  <dgm:styleLbl name="alignAccFollowNode1">
+    <dgm:scene3d>
+      <a:camera prst="orthographicFront"/>
+      <a:lightRig rig="threePt" dir="t"/>
+    </dgm:scene3d>
+    <dgm:sp3d/>
+    <dgm:txPr/>
+    <dgm:style>
+      <a:lnRef idx="2">
+        <a:scrgbClr r="0" g="0" b="0"/>
+      </a:lnRef>
+      <a:fillRef idx="1">
+        <a:scrgbClr r="0" g="0" b="0"/>
+      </a:fillRef>
+      <a:effectRef idx="0">
+        <a:scrgbClr r="0" g="0" b="0"/>
+      </a:effectRef>
+      <a:fontRef idx="minor"/>
+    </dgm:style>
+  </dgm:styleLbl>
+  <dgm:styleLbl name="bgAccFollowNode1">
+    <dgm:scene3d>
+      <a:camera prst="orthographicFront"/>
+      <a:lightRig rig="threePt" dir="t"/>
+    </dgm:scene3d>
+    <dgm:sp3d/>
+    <dgm:txPr/>
+    <dgm:style>
+      <a:lnRef idx="2">
+        <a:scrgbClr r="0" g="0" b="0"/>
+      </a:lnRef>
+      <a:fillRef idx="1">
+        <a:scrgbClr r="0" g="0" b="0"/>
+      </a:fillRef>
+      <a:effectRef idx="0">
+        <a:scrgbClr r="0" g="0" b="0"/>
+      </a:effectRef>
+      <a:fontRef idx="minor"/>
+    </dgm:style>
+  </dgm:styleLbl>
+  <dgm:styleLbl name="fgAcc0">
+    <dgm:scene3d>
+      <a:camera prst="orthographicFront"/>
+      <a:lightRig rig="threePt" dir="t"/>
+    </dgm:scene3d>
+    <dgm:sp3d/>
+    <dgm:txPr/>
+    <dgm:style>
+      <a:lnRef idx="2">
+        <a:scrgbClr r="0" g="0" b="0"/>
+      </a:lnRef>
+      <a:fillRef idx="1">
+        <a:scrgbClr r="0" g="0" b="0"/>
+      </a:fillRef>
+      <a:effectRef idx="0">
+        <a:scrgbClr r="0" g="0" b="0"/>
+      </a:effectRef>
+      <a:fontRef idx="minor"/>
+    </dgm:style>
+  </dgm:styleLbl>
+  <dgm:styleLbl name="fgAcc2">
+    <dgm:scene3d>
+      <a:camera prst="orthographicFront"/>
+      <a:lightRig rig="threePt" dir="t"/>
+    </dgm:scene3d>
+    <dgm:sp3d/>
+    <dgm:txPr/>
+    <dgm:style>
+      <a:lnRef idx="2">
+        <a:scrgbClr r="0" g="0" b="0"/>
+      </a:lnRef>
+      <a:fillRef idx="1">
+        <a:scrgbClr r="0" g="0" b="0"/>
+      </a:fillRef>
+      <a:effectRef idx="0">
+        <a:scrgbClr r="0" g="0" b="0"/>
+      </a:effectRef>
+      <a:fontRef idx="minor"/>
+    </dgm:style>
+  </dgm:styleLbl>
+  <dgm:styleLbl name="fgAcc3">
+    <dgm:scene3d>
+      <a:camera prst="orthographicFront"/>
+      <a:lightRig rig="threePt" dir="t"/>
+    </dgm:scene3d>
+    <dgm:sp3d/>
+    <dgm:txPr/>
+    <dgm:style>
+      <a:lnRef idx="2">
+        <a:scrgbClr r="0" g="0" b="0"/>
+      </a:lnRef>
+      <a:fillRef idx="1">
+        <a:scrgbClr r="0" g="0" b="0"/>
+      </a:fillRef>
+      <a:effectRef idx="0">
+        <a:scrgbClr r="0" g="0" b="0"/>
+      </a:effectRef>
+      <a:fontRef idx="minor"/>
+    </dgm:style>
+  </dgm:styleLbl>
+  <dgm:styleLbl name="fgAcc4">
+    <dgm:scene3d>
+      <a:camera prst="orthographicFront"/>
+      <a:lightRig rig="threePt" dir="t"/>
+    </dgm:scene3d>
+    <dgm:sp3d/>
+    <dgm:txPr/>
+    <dgm:style>
+      <a:lnRef idx="2">
+        <a:scrgbClr r="0" g="0" b="0"/>
+      </a:lnRef>
+      <a:fillRef idx="1">
+        <a:scrgbClr r="0" g="0" b="0"/>
+      </a:fillRef>
+      <a:effectRef idx="0">
+        <a:scrgbClr r="0" g="0" b="0"/>
+      </a:effectRef>
+      <a:fontRef idx="minor"/>
+    </dgm:style>
+  </dgm:styleLbl>
+  <dgm:styleLbl name="bgShp">
+    <dgm:scene3d>
+      <a:camera prst="orthographicFront"/>
+      <a:lightRig rig="threePt" dir="t"/>
+    </dgm:scene3d>
+    <dgm:sp3d/>
+    <dgm:txPr/>
+    <dgm:style>
+      <a:lnRef idx="0">
+        <a:scrgbClr r="0" g="0" b="0"/>
+      </a:lnRef>
+      <a:fillRef idx="1">
+        <a:scrgbClr r="0" g="0" b="0"/>
+      </a:fillRef>
+      <a:effectRef idx="0">
+        <a:scrgbClr r="0" g="0" b="0"/>
+      </a:effectRef>
+      <a:fontRef idx="minor"/>
+    </dgm:style>
+  </dgm:styleLbl>
+  <dgm:styleLbl name="dkBgShp">
+    <dgm:scene3d>
+      <a:camera prst="orthographicFront"/>
+      <a:lightRig rig="threePt" dir="t"/>
+    </dgm:scene3d>
+    <dgm:sp3d/>
+    <dgm:txPr/>
+    <dgm:style>
+      <a:lnRef idx="0">
+        <a:scrgbClr r="0" g="0" b="0"/>
+      </a:lnRef>
+      <a:fillRef idx="1">
+        <a:scrgbClr r="0" g="0" b="0"/>
+      </a:fillRef>
+      <a:effectRef idx="0">
+        <a:scrgbClr r="0" g="0" b="0"/>
+      </a:effectRef>
+      <a:fontRef idx="minor"/>
+    </dgm:style>
+  </dgm:styleLbl>
+  <dgm:styleLbl name="trBgShp">
+    <dgm:scene3d>
+      <a:camera prst="orthographicFront"/>
+      <a:lightRig rig="threePt" dir="t"/>
+    </dgm:scene3d>
+    <dgm:sp3d/>
+    <dgm:txPr/>
+    <dgm:style>
+      <a:lnRef idx="0">
+        <a:scrgbClr r="0" g="0" b="0"/>
+      </a:lnRef>
+      <a:fillRef idx="1">
+        <a:scrgbClr r="0" g="0" b="0"/>
+      </a:fillRef>
+      <a:effectRef idx="0">
+        <a:scrgbClr r="0" g="0" b="0"/>
+      </a:effectRef>
+      <a:fontRef idx="minor"/>
+    </dgm:style>
+  </dgm:styleLbl>
+  <dgm:styleLbl name="fgShp">
+    <dgm:scene3d>
+      <a:camera prst="orthographicFront"/>
+      <a:lightRig rig="threePt" dir="t"/>
+    </dgm:scene3d>
+    <dgm:sp3d/>
+    <dgm:txPr/>
+    <dgm:style>
+      <a:lnRef idx="2">
+        <a:scrgbClr r="0" g="0" b="0"/>
+      </a:lnRef>
+      <a:fillRef idx="1">
+        <a:scrgbClr r="0" g="0" b="0"/>
+      </a:fillRef>
+      <a:effectRef idx="0">
+        <a:scrgbClr r="0" g="0" b="0"/>
+      </a:effectRef>
+      <a:fontRef idx="minor"/>
+    </dgm:style>
+  </dgm:styleLbl>
+  <dgm:styleLbl name="revTx">
+    <dgm:scene3d>
+      <a:camera prst="orthographicFront"/>
+      <a:lightRig rig="threePt" dir="t"/>
+    </dgm:scene3d>
+    <dgm:sp3d/>
+    <dgm:txPr/>
+    <dgm:style>
+      <a:lnRef idx="0">
+        <a:scrgbClr r="0" g="0" b="0"/>
+      </a:lnRef>
+      <a:fillRef idx="0">
+        <a:scrgbClr r="0" g="0" b="0"/>
+      </a:fillRef>
+      <a:effectRef idx="0">
+        <a:scrgbClr r="0" g="0" b="0"/>
+      </a:effectRef>
+      <a:fontRef idx="minor"/>
+    </dgm:style>
+  </dgm:styleLbl>
+</dgm:styleDef>
 </file>
 
 <file path=ppt/slideLayouts/slideLayout1.xml><?xml version="1.0" encoding="utf-8"?>
@@ -3312,6 +5950,14 @@
 <file path=ppt/slides/slide1.xml><?xml version="1.0" encoding="utf-8"?>
 <p:sld xmlns:a="http://schemas.openxmlformats.org/drawingml/2006/main" xmlns:r="http://schemas.openxmlformats.org/officeDocument/2006/relationships" xmlns:p="http://schemas.openxmlformats.org/presentationml/2006/main">
   <p:cSld>
+    <p:bg>
+      <p:bgPr>
+        <a:solidFill>
+          <a:schemeClr val="bg1"/>
+        </a:solidFill>
+        <a:effectLst/>
+      </p:bgPr>
+    </p:bg>
     <p:spTree>
       <p:nvGrpSpPr>
         <p:cNvPr id="1" name=""/>
@@ -3328,6 +5974,72 @@
       </p:grpSpPr>
       <p:sp>
         <p:nvSpPr>
+          <p:cNvPr id="30" name="Rectangle 29">
+            <a:extLst>
+              <a:ext uri="{FF2B5EF4-FFF2-40B4-BE49-F238E27FC236}">
+                <a16:creationId xmlns:a16="http://schemas.microsoft.com/office/drawing/2014/main" id="{C3896A03-3945-419A-B66B-4EE266EDD152}"/>
+              </a:ext>
+              <a:ext uri="{C183D7F6-B498-43B3-948B-1728B52AA6E4}">
+                <adec:decorative xmlns:adec="http://schemas.microsoft.com/office/drawing/2017/decorative" val="1"/>
+              </a:ext>
+            </a:extLst>
+          </p:cNvPr>
+          <p:cNvSpPr>
+            <a:spLocks noGrp="1" noRot="1" noChangeAspect="1" noMove="1" noResize="1" noEditPoints="1" noAdjustHandles="1" noChangeArrowheads="1" noChangeShapeType="1" noTextEdit="1"/>
+          </p:cNvSpPr>
+          <p:nvPr>
+            <p:extLst>
+              <p:ext uri="{386F3935-93C4-4BCD-93E2-E3B085C9AB24}">
+                <p16:designElem xmlns:p16="http://schemas.microsoft.com/office/powerpoint/2015/main" val="1"/>
+              </p:ext>
+            </p:extLst>
+          </p:nvPr>
+        </p:nvSpPr>
+        <p:spPr>
+          <a:xfrm>
+            <a:off x="10" y="0"/>
+            <a:ext cx="6083447" cy="6858001"/>
+          </a:xfrm>
+          <a:prstGeom prst="rect">
+            <a:avLst/>
+          </a:prstGeom>
+          <a:solidFill>
+            <a:schemeClr val="tx1">
+              <a:lumMod val="85000"/>
+              <a:lumOff val="15000"/>
+            </a:schemeClr>
+          </a:solidFill>
+          <a:ln>
+            <a:noFill/>
+          </a:ln>
+        </p:spPr>
+        <p:style>
+          <a:lnRef idx="2">
+            <a:schemeClr val="accent1">
+              <a:shade val="50000"/>
+            </a:schemeClr>
+          </a:lnRef>
+          <a:fillRef idx="1">
+            <a:schemeClr val="accent1"/>
+          </a:fillRef>
+          <a:effectRef idx="0">
+            <a:schemeClr val="accent1"/>
+          </a:effectRef>
+          <a:fontRef idx="minor">
+            <a:schemeClr val="lt1"/>
+          </a:fontRef>
+        </p:style>
+        <p:txBody>
+          <a:bodyPr rtlCol="0" anchor="ctr"/>
+          <a:lstStyle/>
+          <a:p>
+            <a:pPr algn="ctr"/>
+            <a:endParaRPr lang="en-US"/>
+          </a:p>
+        </p:txBody>
+      </p:sp>
+      <p:sp>
+        <p:nvSpPr>
           <p:cNvPr id="2" name="Title 1">
             <a:extLst>
               <a:ext uri="{FF2B5EF4-FFF2-40B4-BE49-F238E27FC236}">
@@ -3342,13 +6054,25 @@
             <p:ph type="ctrTitle"/>
           </p:nvPr>
         </p:nvSpPr>
-        <p:spPr/>
-        <p:txBody>
-          <a:bodyPr/>
+        <p:spPr>
+          <a:xfrm>
+            <a:off x="1155558" y="637762"/>
+            <a:ext cx="4284397" cy="5576770"/>
+          </a:xfrm>
+        </p:spPr>
+        <p:txBody>
+          <a:bodyPr anchor="ctr">
+            <a:normAutofit/>
+          </a:bodyPr>
           <a:lstStyle/>
           <a:p>
+            <a:pPr algn="l"/>
             <a:r>
-              <a:rPr lang="en-US" dirty="0"/>
+              <a:rPr lang="en-US" sz="6600">
+                <a:solidFill>
+                  <a:schemeClr val="bg1"/>
+                </a:solidFill>
+              </a:rPr>
               <a:t>SweetVerse</a:t>
             </a:r>
           </a:p>
@@ -3356,6 +6080,71 @@
       </p:sp>
       <p:sp>
         <p:nvSpPr>
+          <p:cNvPr id="32" name="Rectangle 31">
+            <a:extLst>
+              <a:ext uri="{FF2B5EF4-FFF2-40B4-BE49-F238E27FC236}">
+                <a16:creationId xmlns:a16="http://schemas.microsoft.com/office/drawing/2014/main" id="{B34F5AD2-EDBD-4BBD-A55C-EAFFD0C7097A}"/>
+              </a:ext>
+              <a:ext uri="{C183D7F6-B498-43B3-948B-1728B52AA6E4}">
+                <adec:decorative xmlns:adec="http://schemas.microsoft.com/office/drawing/2017/decorative" val="1"/>
+              </a:ext>
+            </a:extLst>
+          </p:cNvPr>
+          <p:cNvSpPr>
+            <a:spLocks noGrp="1" noRot="1" noChangeAspect="1" noMove="1" noResize="1" noEditPoints="1" noAdjustHandles="1" noChangeArrowheads="1" noChangeShapeType="1" noTextEdit="1"/>
+          </p:cNvSpPr>
+          <p:nvPr>
+            <p:extLst>
+              <p:ext uri="{386F3935-93C4-4BCD-93E2-E3B085C9AB24}">
+                <p16:designElem xmlns:p16="http://schemas.microsoft.com/office/powerpoint/2015/main" val="1"/>
+              </p:ext>
+            </p:extLst>
+          </p:nvPr>
+        </p:nvSpPr>
+        <p:spPr>
+          <a:xfrm>
+            <a:off x="6096000" y="0"/>
+            <a:ext cx="6095990" cy="6858001"/>
+          </a:xfrm>
+          <a:prstGeom prst="rect">
+            <a:avLst/>
+          </a:prstGeom>
+          <a:solidFill>
+            <a:schemeClr val="bg1">
+              <a:lumMod val="95000"/>
+            </a:schemeClr>
+          </a:solidFill>
+          <a:ln>
+            <a:noFill/>
+          </a:ln>
+        </p:spPr>
+        <p:style>
+          <a:lnRef idx="2">
+            <a:schemeClr val="accent1">
+              <a:shade val="50000"/>
+            </a:schemeClr>
+          </a:lnRef>
+          <a:fillRef idx="1">
+            <a:schemeClr val="accent1"/>
+          </a:fillRef>
+          <a:effectRef idx="0">
+            <a:schemeClr val="accent1"/>
+          </a:effectRef>
+          <a:fontRef idx="minor">
+            <a:schemeClr val="lt1"/>
+          </a:fontRef>
+        </p:style>
+        <p:txBody>
+          <a:bodyPr rtlCol="0" anchor="ctr"/>
+          <a:lstStyle/>
+          <a:p>
+            <a:pPr algn="ctr"/>
+            <a:endParaRPr lang="en-US"/>
+          </a:p>
+        </p:txBody>
+      </p:sp>
+      <p:sp>
+        <p:nvSpPr>
           <p:cNvPr id="3" name="Subtitle 2">
             <a:extLst>
               <a:ext uri="{FF2B5EF4-FFF2-40B4-BE49-F238E27FC236}">
@@ -3370,13 +6159,21 @@
             <p:ph type="subTitle" idx="1"/>
           </p:nvPr>
         </p:nvSpPr>
-        <p:spPr/>
-        <p:txBody>
-          <a:bodyPr/>
+        <p:spPr>
+          <a:xfrm>
+            <a:off x="6739464" y="637762"/>
+            <a:ext cx="4305881" cy="5860946"/>
+          </a:xfrm>
+        </p:spPr>
+        <p:txBody>
+          <a:bodyPr anchor="ctr">
+            <a:normAutofit/>
+          </a:bodyPr>
           <a:lstStyle/>
           <a:p>
+            <a:pPr algn="l"/>
             <a:r>
-              <a:rPr lang="en-US" dirty="0"/>
+              <a:rPr lang="en-US" sz="4000"/>
               <a:t>By Harsha Gundavelli</a:t>
             </a:r>
           </a:p>
@@ -3392,12 +6189,159 @@
   <p:clrMapOvr>
     <a:masterClrMapping/>
   </p:clrMapOvr>
+  <p:timing>
+    <p:tnLst>
+      <p:par>
+        <p:cTn id="1" dur="indefinite" restart="never" nodeType="tmRoot">
+          <p:childTnLst>
+            <p:seq concurrent="1" nextAc="seek">
+              <p:cTn id="2" dur="indefinite" nodeType="mainSeq">
+                <p:childTnLst>
+                  <p:par>
+                    <p:cTn id="3" fill="hold">
+                      <p:stCondLst>
+                        <p:cond delay="indefinite"/>
+                        <p:cond evt="onBegin" delay="0">
+                          <p:tn val="2"/>
+                        </p:cond>
+                      </p:stCondLst>
+                      <p:childTnLst>
+                        <p:par>
+                          <p:cTn id="4" fill="hold">
+                            <p:stCondLst>
+                              <p:cond delay="0"/>
+                            </p:stCondLst>
+                            <p:childTnLst>
+                              <p:par>
+                                <p:cTn id="5" presetID="10" presetClass="entr" presetSubtype="0" fill="hold" grpId="0" nodeType="withEffect">
+                                  <p:stCondLst>
+                                    <p:cond delay="500"/>
+                                  </p:stCondLst>
+                                  <p:iterate>
+                                    <p:tmPct val="10000"/>
+                                  </p:iterate>
+                                  <p:childTnLst>
+                                    <p:set>
+                                      <p:cBhvr>
+                                        <p:cTn id="6" dur="1" fill="hold">
+                                          <p:stCondLst>
+                                            <p:cond delay="0"/>
+                                          </p:stCondLst>
+                                        </p:cTn>
+                                        <p:tgtEl>
+                                          <p:spTgt spid="2"/>
+                                        </p:tgtEl>
+                                        <p:attrNameLst>
+                                          <p:attrName>style.visibility</p:attrName>
+                                        </p:attrNameLst>
+                                      </p:cBhvr>
+                                      <p:to>
+                                        <p:strVal val="visible"/>
+                                      </p:to>
+                                    </p:set>
+                                    <p:animEffect transition="in" filter="fade">
+                                      <p:cBhvr>
+                                        <p:cTn id="7" dur="700"/>
+                                        <p:tgtEl>
+                                          <p:spTgt spid="2"/>
+                                        </p:tgtEl>
+                                      </p:cBhvr>
+                                    </p:animEffect>
+                                  </p:childTnLst>
+                                </p:cTn>
+                              </p:par>
+                              <p:par>
+                                <p:cTn id="8" presetID="10" presetClass="entr" presetSubtype="0" fill="hold" grpId="0" nodeType="withEffect">
+                                  <p:stCondLst>
+                                    <p:cond delay="1000"/>
+                                  </p:stCondLst>
+                                  <p:iterate>
+                                    <p:tmPct val="10000"/>
+                                  </p:iterate>
+                                  <p:childTnLst>
+                                    <p:set>
+                                      <p:cBhvr>
+                                        <p:cTn id="9" dur="1" fill="hold">
+                                          <p:stCondLst>
+                                            <p:cond delay="0"/>
+                                          </p:stCondLst>
+                                        </p:cTn>
+                                        <p:tgtEl>
+                                          <p:spTgt spid="3">
+                                            <p:txEl>
+                                              <p:pRg st="0" end="0"/>
+                                            </p:txEl>
+                                          </p:spTgt>
+                                        </p:tgtEl>
+                                        <p:attrNameLst>
+                                          <p:attrName>style.visibility</p:attrName>
+                                        </p:attrNameLst>
+                                      </p:cBhvr>
+                                      <p:to>
+                                        <p:strVal val="visible"/>
+                                      </p:to>
+                                    </p:set>
+                                    <p:animEffect transition="in" filter="fade">
+                                      <p:cBhvr>
+                                        <p:cTn id="10" dur="700"/>
+                                        <p:tgtEl>
+                                          <p:spTgt spid="3">
+                                            <p:txEl>
+                                              <p:pRg st="0" end="0"/>
+                                            </p:txEl>
+                                          </p:spTgt>
+                                        </p:tgtEl>
+                                      </p:cBhvr>
+                                    </p:animEffect>
+                                  </p:childTnLst>
+                                </p:cTn>
+                              </p:par>
+                            </p:childTnLst>
+                          </p:cTn>
+                        </p:par>
+                      </p:childTnLst>
+                    </p:cTn>
+                  </p:par>
+                </p:childTnLst>
+              </p:cTn>
+              <p:prevCondLst>
+                <p:cond evt="onPrev" delay="0">
+                  <p:tgtEl>
+                    <p:sldTgt/>
+                  </p:tgtEl>
+                </p:cond>
+              </p:prevCondLst>
+              <p:nextCondLst>
+                <p:cond evt="onNext" delay="0">
+                  <p:tgtEl>
+                    <p:sldTgt/>
+                  </p:tgtEl>
+                </p:cond>
+              </p:nextCondLst>
+            </p:seq>
+          </p:childTnLst>
+        </p:cTn>
+      </p:par>
+    </p:tnLst>
+    <p:bldLst>
+      <p:bldP spid="2" grpId="0"/>
+      <p:bldP spid="3" grpId="0" build="p"/>
+    </p:bldLst>
+  </p:timing>
 </p:sld>
 </file>
 
 <file path=ppt/slides/slide2.xml><?xml version="1.0" encoding="utf-8"?>
 <p:sld xmlns:a="http://schemas.openxmlformats.org/drawingml/2006/main" xmlns:r="http://schemas.openxmlformats.org/officeDocument/2006/relationships" xmlns:p="http://schemas.openxmlformats.org/presentationml/2006/main">
   <p:cSld>
+    <p:bg>
+      <p:bgPr>
+        <a:solidFill>
+          <a:schemeClr val="bg1"/>
+        </a:solidFill>
+        <a:effectLst/>
+      </p:bgPr>
+    </p:bg>
     <p:spTree>
       <p:nvGrpSpPr>
         <p:cNvPr id="1" name=""/>
@@ -3414,6 +6358,72 @@
       </p:grpSpPr>
       <p:sp>
         <p:nvSpPr>
+          <p:cNvPr id="40" name="Rectangle 39">
+            <a:extLst>
+              <a:ext uri="{FF2B5EF4-FFF2-40B4-BE49-F238E27FC236}">
+                <a16:creationId xmlns:a16="http://schemas.microsoft.com/office/drawing/2014/main" id="{C3896A03-3945-419A-B66B-4EE266EDD152}"/>
+              </a:ext>
+              <a:ext uri="{C183D7F6-B498-43B3-948B-1728B52AA6E4}">
+                <adec:decorative xmlns:adec="http://schemas.microsoft.com/office/drawing/2017/decorative" val="1"/>
+              </a:ext>
+            </a:extLst>
+          </p:cNvPr>
+          <p:cNvSpPr>
+            <a:spLocks noGrp="1" noRot="1" noChangeAspect="1" noMove="1" noResize="1" noEditPoints="1" noAdjustHandles="1" noChangeArrowheads="1" noChangeShapeType="1" noTextEdit="1"/>
+          </p:cNvSpPr>
+          <p:nvPr>
+            <p:extLst>
+              <p:ext uri="{386F3935-93C4-4BCD-93E2-E3B085C9AB24}">
+                <p16:designElem xmlns:p16="http://schemas.microsoft.com/office/powerpoint/2015/main" val="1"/>
+              </p:ext>
+            </p:extLst>
+          </p:nvPr>
+        </p:nvSpPr>
+        <p:spPr>
+          <a:xfrm>
+            <a:off x="10" y="0"/>
+            <a:ext cx="4654285" cy="6858001"/>
+          </a:xfrm>
+          <a:prstGeom prst="rect">
+            <a:avLst/>
+          </a:prstGeom>
+          <a:solidFill>
+            <a:schemeClr val="tx1">
+              <a:lumMod val="85000"/>
+              <a:lumOff val="15000"/>
+            </a:schemeClr>
+          </a:solidFill>
+          <a:ln>
+            <a:noFill/>
+          </a:ln>
+        </p:spPr>
+        <p:style>
+          <a:lnRef idx="2">
+            <a:schemeClr val="accent1">
+              <a:shade val="50000"/>
+            </a:schemeClr>
+          </a:lnRef>
+          <a:fillRef idx="1">
+            <a:schemeClr val="accent1"/>
+          </a:fillRef>
+          <a:effectRef idx="0">
+            <a:schemeClr val="accent1"/>
+          </a:effectRef>
+          <a:fontRef idx="minor">
+            <a:schemeClr val="lt1"/>
+          </a:fontRef>
+        </p:style>
+        <p:txBody>
+          <a:bodyPr rtlCol="0" anchor="ctr"/>
+          <a:lstStyle/>
+          <a:p>
+            <a:pPr algn="ctr"/>
+            <a:endParaRPr lang="en-US"/>
+          </a:p>
+        </p:txBody>
+      </p:sp>
+      <p:sp>
+        <p:nvSpPr>
           <p:cNvPr id="2" name="Title 1">
             <a:extLst>
               <a:ext uri="{FF2B5EF4-FFF2-40B4-BE49-F238E27FC236}">
@@ -3428,13 +6438,24 @@
             <p:ph type="title"/>
           </p:nvPr>
         </p:nvSpPr>
-        <p:spPr/>
-        <p:txBody>
-          <a:bodyPr/>
+        <p:spPr>
+          <a:xfrm>
+            <a:off x="1156851" y="637762"/>
+            <a:ext cx="2898276" cy="5576770"/>
+          </a:xfrm>
+        </p:spPr>
+        <p:txBody>
+          <a:bodyPr anchor="t">
+            <a:normAutofit/>
+          </a:bodyPr>
           <a:lstStyle/>
           <a:p>
             <a:r>
-              <a:rPr lang="en-US" dirty="0"/>
+              <a:rPr lang="en-US">
+                <a:solidFill>
+                  <a:schemeClr val="bg1"/>
+                </a:solidFill>
+              </a:rPr>
               <a:t>About</a:t>
             </a:r>
           </a:p>
@@ -3442,6 +6463,134 @@
       </p:sp>
       <p:sp>
         <p:nvSpPr>
+          <p:cNvPr id="41" name="Rectangle 40">
+            <a:extLst>
+              <a:ext uri="{FF2B5EF4-FFF2-40B4-BE49-F238E27FC236}">
+                <a16:creationId xmlns:a16="http://schemas.microsoft.com/office/drawing/2014/main" id="{B34F5AD2-EDBD-4BBD-A55C-EAFFD0C7097A}"/>
+              </a:ext>
+              <a:ext uri="{C183D7F6-B498-43B3-948B-1728B52AA6E4}">
+                <adec:decorative xmlns:adec="http://schemas.microsoft.com/office/drawing/2017/decorative" val="1"/>
+              </a:ext>
+            </a:extLst>
+          </p:cNvPr>
+          <p:cNvSpPr>
+            <a:spLocks noGrp="1" noRot="1" noChangeAspect="1" noMove="1" noResize="1" noEditPoints="1" noAdjustHandles="1" noChangeArrowheads="1" noChangeShapeType="1" noTextEdit="1"/>
+          </p:cNvSpPr>
+          <p:nvPr>
+            <p:extLst>
+              <p:ext uri="{386F3935-93C4-4BCD-93E2-E3B085C9AB24}">
+                <p16:designElem xmlns:p16="http://schemas.microsoft.com/office/powerpoint/2015/main" val="1"/>
+              </p:ext>
+            </p:extLst>
+          </p:nvPr>
+        </p:nvSpPr>
+        <p:spPr>
+          <a:xfrm>
+            <a:off x="4652535" y="0"/>
+            <a:ext cx="7539455" cy="6858001"/>
+          </a:xfrm>
+          <a:prstGeom prst="rect">
+            <a:avLst/>
+          </a:prstGeom>
+          <a:solidFill>
+            <a:schemeClr val="bg1">
+              <a:lumMod val="95000"/>
+            </a:schemeClr>
+          </a:solidFill>
+          <a:ln>
+            <a:noFill/>
+          </a:ln>
+        </p:spPr>
+        <p:style>
+          <a:lnRef idx="2">
+            <a:schemeClr val="accent1">
+              <a:shade val="50000"/>
+            </a:schemeClr>
+          </a:lnRef>
+          <a:fillRef idx="1">
+            <a:schemeClr val="accent1"/>
+          </a:fillRef>
+          <a:effectRef idx="0">
+            <a:schemeClr val="accent1"/>
+          </a:effectRef>
+          <a:fontRef idx="minor">
+            <a:schemeClr val="lt1"/>
+          </a:fontRef>
+        </p:style>
+        <p:txBody>
+          <a:bodyPr rtlCol="0" anchor="ctr"/>
+          <a:lstStyle/>
+          <a:p>
+            <a:pPr algn="ctr"/>
+            <a:endParaRPr lang="en-US"/>
+          </a:p>
+        </p:txBody>
+      </p:sp>
+      <p:sp>
+        <p:nvSpPr>
+          <p:cNvPr id="42" name="Rectangle 41">
+            <a:extLst>
+              <a:ext uri="{FF2B5EF4-FFF2-40B4-BE49-F238E27FC236}">
+                <a16:creationId xmlns:a16="http://schemas.microsoft.com/office/drawing/2014/main" id="{B8EAE243-3A9F-4A46-B0D9-04C723A8A1BD}"/>
+              </a:ext>
+              <a:ext uri="{C183D7F6-B498-43B3-948B-1728B52AA6E4}">
+                <adec:decorative xmlns:adec="http://schemas.microsoft.com/office/drawing/2017/decorative" val="1"/>
+              </a:ext>
+            </a:extLst>
+          </p:cNvPr>
+          <p:cNvSpPr>
+            <a:spLocks noGrp="1" noRot="1" noChangeAspect="1" noMove="1" noResize="1" noEditPoints="1" noAdjustHandles="1" noChangeArrowheads="1" noChangeShapeType="1" noTextEdit="1"/>
+          </p:cNvSpPr>
+          <p:nvPr>
+            <p:extLst>
+              <p:ext uri="{386F3935-93C4-4BCD-93E2-E3B085C9AB24}">
+                <p16:designElem xmlns:p16="http://schemas.microsoft.com/office/powerpoint/2015/main" val="1"/>
+              </p:ext>
+            </p:extLst>
+          </p:nvPr>
+        </p:nvSpPr>
+        <p:spPr>
+          <a:xfrm>
+            <a:off x="5439977" y="643465"/>
+            <a:ext cx="457200" cy="45720"/>
+          </a:xfrm>
+          <a:prstGeom prst="rect">
+            <a:avLst/>
+          </a:prstGeom>
+          <a:solidFill>
+            <a:schemeClr val="tx1"/>
+          </a:solidFill>
+          <a:ln>
+            <a:noFill/>
+          </a:ln>
+        </p:spPr>
+        <p:style>
+          <a:lnRef idx="2">
+            <a:schemeClr val="accent1">
+              <a:shade val="50000"/>
+            </a:schemeClr>
+          </a:lnRef>
+          <a:fillRef idx="1">
+            <a:schemeClr val="accent1"/>
+          </a:fillRef>
+          <a:effectRef idx="0">
+            <a:schemeClr val="accent1"/>
+          </a:effectRef>
+          <a:fontRef idx="minor">
+            <a:schemeClr val="lt1"/>
+          </a:fontRef>
+        </p:style>
+        <p:txBody>
+          <a:bodyPr rtlCol="0" anchor="ctr"/>
+          <a:lstStyle/>
+          <a:p>
+            <a:pPr algn="ctr"/>
+            <a:endParaRPr lang="en-US"/>
+          </a:p>
+        </p:txBody>
+      </p:sp>
+      <p:sp>
+        <p:nvSpPr>
           <p:cNvPr id="3" name="Content Placeholder 2">
             <a:extLst>
               <a:ext uri="{FF2B5EF4-FFF2-40B4-BE49-F238E27FC236}">
@@ -3456,20 +6605,27 @@
             <p:ph idx="1"/>
           </p:nvPr>
         </p:nvSpPr>
-        <p:spPr/>
-        <p:txBody>
-          <a:bodyPr/>
+        <p:spPr>
+          <a:xfrm>
+            <a:off x="5439976" y="850052"/>
+            <a:ext cx="5605373" cy="5326911"/>
+          </a:xfrm>
+        </p:spPr>
+        <p:txBody>
+          <a:bodyPr>
+            <a:normAutofit/>
+          </a:bodyPr>
           <a:lstStyle/>
           <a:p>
             <a:pPr marL="0" indent="0">
               <a:buNone/>
             </a:pPr>
             <a:r>
-              <a:rPr lang="en-US" b="1" dirty="0"/>
-              <a:t>Sweet Verse</a:t>
+              <a:rPr lang="en-US" sz="2400" b="1"/>
+              <a:t>SweetVerse</a:t>
             </a:r>
             <a:r>
-              <a:rPr lang="en-US" dirty="0"/>
+              <a:rPr lang="en-US" sz="2400"/>
               <a:t> is a specialized inventory management and point-of-sale system designed for ice cream parlors. It simplifies daily operations by integrating the sales process directly with stock management.</a:t>
             </a:r>
           </a:p>
@@ -3491,6 +6647,14 @@
 <file path=ppt/slides/slide3.xml><?xml version="1.0" encoding="utf-8"?>
 <p:sld xmlns:a="http://schemas.openxmlformats.org/drawingml/2006/main" xmlns:r="http://schemas.openxmlformats.org/officeDocument/2006/relationships" xmlns:p="http://schemas.openxmlformats.org/presentationml/2006/main">
   <p:cSld>
+    <p:bg>
+      <p:bgPr>
+        <a:solidFill>
+          <a:schemeClr val="bg1"/>
+        </a:solidFill>
+        <a:effectLst/>
+      </p:bgPr>
+    </p:bg>
     <p:spTree>
       <p:nvGrpSpPr>
         <p:cNvPr id="1" name=""/>
@@ -3507,9 +6671,420 @@
       </p:grpSpPr>
       <p:sp>
         <p:nvSpPr>
+          <p:cNvPr id="23" name="Rectangle 22">
+            <a:extLst>
+              <a:ext uri="{FF2B5EF4-FFF2-40B4-BE49-F238E27FC236}">
+                <a16:creationId xmlns:a16="http://schemas.microsoft.com/office/drawing/2014/main" id="{C3896A03-3945-419A-B66B-4EE266EDD152}"/>
+              </a:ext>
+              <a:ext uri="{C183D7F6-B498-43B3-948B-1728B52AA6E4}">
+                <adec:decorative xmlns:adec="http://schemas.microsoft.com/office/drawing/2017/decorative" val="1"/>
+              </a:ext>
+            </a:extLst>
+          </p:cNvPr>
+          <p:cNvSpPr>
+            <a:spLocks noGrp="1" noRot="1" noChangeAspect="1" noMove="1" noResize="1" noEditPoints="1" noAdjustHandles="1" noChangeArrowheads="1" noChangeShapeType="1" noTextEdit="1"/>
+          </p:cNvSpPr>
+          <p:nvPr>
+            <p:extLst>
+              <p:ext uri="{386F3935-93C4-4BCD-93E2-E3B085C9AB24}">
+                <p16:designElem xmlns:p16="http://schemas.microsoft.com/office/powerpoint/2015/main" val="1"/>
+              </p:ext>
+            </p:extLst>
+          </p:nvPr>
+        </p:nvSpPr>
+        <p:spPr>
+          <a:xfrm>
+            <a:off x="11" y="0"/>
+            <a:ext cx="4654286" cy="6858001"/>
+          </a:xfrm>
+          <a:prstGeom prst="rect">
+            <a:avLst/>
+          </a:prstGeom>
+          <a:solidFill>
+            <a:schemeClr val="tx1">
+              <a:lumMod val="85000"/>
+              <a:lumOff val="15000"/>
+            </a:schemeClr>
+          </a:solidFill>
+          <a:ln>
+            <a:noFill/>
+          </a:ln>
+        </p:spPr>
+        <p:style>
+          <a:lnRef idx="2">
+            <a:schemeClr val="accent1">
+              <a:shade val="50000"/>
+            </a:schemeClr>
+          </a:lnRef>
+          <a:fillRef idx="1">
+            <a:schemeClr val="accent1"/>
+          </a:fillRef>
+          <a:effectRef idx="0">
+            <a:schemeClr val="accent1"/>
+          </a:effectRef>
+          <a:fontRef idx="minor">
+            <a:schemeClr val="lt1"/>
+          </a:fontRef>
+        </p:style>
+        <p:txBody>
+          <a:bodyPr rtlCol="0" anchor="ctr"/>
+          <a:lstStyle/>
+          <a:p>
+            <a:pPr algn="ctr"/>
+            <a:endParaRPr lang="en-US"/>
+          </a:p>
+        </p:txBody>
+      </p:sp>
+      <p:sp>
+        <p:nvSpPr>
           <p:cNvPr id="2" name="Title 1">
             <a:extLst>
               <a:ext uri="{FF2B5EF4-FFF2-40B4-BE49-F238E27FC236}">
+                <a16:creationId xmlns:a16="http://schemas.microsoft.com/office/drawing/2014/main" id="{83E2F862-0281-544D-C6F1-7A0AE94310E9}"/>
+              </a:ext>
+            </a:extLst>
+          </p:cNvPr>
+          <p:cNvSpPr>
+            <a:spLocks noGrp="1"/>
+          </p:cNvSpPr>
+          <p:nvPr>
+            <p:ph type="title"/>
+          </p:nvPr>
+        </p:nvSpPr>
+        <p:spPr>
+          <a:xfrm>
+            <a:off x="1155559" y="637762"/>
+            <a:ext cx="2899568" cy="5576770"/>
+          </a:xfrm>
+        </p:spPr>
+        <p:txBody>
+          <a:bodyPr vert="horz" lIns="91440" tIns="45720" rIns="91440" bIns="45720" rtlCol="0" anchor="ctr">
+            <a:normAutofit/>
+          </a:bodyPr>
+          <a:lstStyle/>
+          <a:p>
+            <a:r>
+              <a:rPr lang="en-US" kern="1200">
+                <a:solidFill>
+                  <a:schemeClr val="bg1"/>
+                </a:solidFill>
+                <a:latin typeface="+mj-lt"/>
+                <a:ea typeface="+mj-ea"/>
+                <a:cs typeface="+mj-cs"/>
+              </a:rPr>
+              <a:t>Persistence</a:t>
+            </a:r>
+          </a:p>
+        </p:txBody>
+      </p:sp>
+      <p:sp>
+        <p:nvSpPr>
+          <p:cNvPr id="25" name="Rectangle 24">
+            <a:extLst>
+              <a:ext uri="{FF2B5EF4-FFF2-40B4-BE49-F238E27FC236}">
+                <a16:creationId xmlns:a16="http://schemas.microsoft.com/office/drawing/2014/main" id="{B34F5AD2-EDBD-4BBD-A55C-EAFFD0C7097A}"/>
+              </a:ext>
+              <a:ext uri="{C183D7F6-B498-43B3-948B-1728B52AA6E4}">
+                <adec:decorative xmlns:adec="http://schemas.microsoft.com/office/drawing/2017/decorative" val="1"/>
+              </a:ext>
+            </a:extLst>
+          </p:cNvPr>
+          <p:cNvSpPr>
+            <a:spLocks noGrp="1" noRot="1" noChangeAspect="1" noMove="1" noResize="1" noEditPoints="1" noAdjustHandles="1" noChangeArrowheads="1" noChangeShapeType="1" noTextEdit="1"/>
+          </p:cNvSpPr>
+          <p:nvPr>
+            <p:extLst>
+              <p:ext uri="{386F3935-93C4-4BCD-93E2-E3B085C9AB24}">
+                <p16:designElem xmlns:p16="http://schemas.microsoft.com/office/powerpoint/2015/main" val="1"/>
+              </p:ext>
+            </p:extLst>
+          </p:nvPr>
+        </p:nvSpPr>
+        <p:spPr>
+          <a:xfrm>
+            <a:off x="4652535" y="0"/>
+            <a:ext cx="7539455" cy="6858001"/>
+          </a:xfrm>
+          <a:prstGeom prst="rect">
+            <a:avLst/>
+          </a:prstGeom>
+          <a:solidFill>
+            <a:schemeClr val="bg1">
+              <a:lumMod val="95000"/>
+            </a:schemeClr>
+          </a:solidFill>
+          <a:ln>
+            <a:noFill/>
+          </a:ln>
+        </p:spPr>
+        <p:style>
+          <a:lnRef idx="2">
+            <a:schemeClr val="accent1">
+              <a:shade val="50000"/>
+            </a:schemeClr>
+          </a:lnRef>
+          <a:fillRef idx="1">
+            <a:schemeClr val="accent1"/>
+          </a:fillRef>
+          <a:effectRef idx="0">
+            <a:schemeClr val="accent1"/>
+          </a:effectRef>
+          <a:fontRef idx="minor">
+            <a:schemeClr val="lt1"/>
+          </a:fontRef>
+        </p:style>
+        <p:txBody>
+          <a:bodyPr rtlCol="0" anchor="ctr"/>
+          <a:lstStyle/>
+          <a:p>
+            <a:pPr algn="ctr"/>
+            <a:endParaRPr lang="en-US"/>
+          </a:p>
+        </p:txBody>
+      </p:sp>
+      <p:sp>
+        <p:nvSpPr>
+          <p:cNvPr id="3" name="Content Placeholder 2">
+            <a:extLst>
+              <a:ext uri="{FF2B5EF4-FFF2-40B4-BE49-F238E27FC236}">
+                <a16:creationId xmlns:a16="http://schemas.microsoft.com/office/drawing/2014/main" id="{1427FFF7-CB63-E380-2C29-EE00CD38CF1E}"/>
+              </a:ext>
+            </a:extLst>
+          </p:cNvPr>
+          <p:cNvSpPr>
+            <a:spLocks noGrp="1"/>
+          </p:cNvSpPr>
+          <p:nvPr>
+            <p:ph idx="1"/>
+          </p:nvPr>
+        </p:nvSpPr>
+        <p:spPr>
+          <a:xfrm>
+            <a:off x="5444775" y="637762"/>
+            <a:ext cx="5600580" cy="5576770"/>
+          </a:xfrm>
+        </p:spPr>
+        <p:txBody>
+          <a:bodyPr vert="horz" lIns="91440" tIns="45720" rIns="91440" bIns="45720" rtlCol="0" anchor="ctr">
+            <a:normAutofit/>
+          </a:bodyPr>
+          <a:lstStyle/>
+          <a:p>
+            <a:pPr marL="0" indent="0">
+              <a:buNone/>
+            </a:pPr>
+            <a:r>
+              <a:rPr lang="en-US" sz="3200" kern="1200">
+                <a:solidFill>
+                  <a:schemeClr val="tx1"/>
+                </a:solidFill>
+                <a:latin typeface="+mn-lt"/>
+                <a:ea typeface="+mn-ea"/>
+                <a:cs typeface="+mn-cs"/>
+              </a:rPr>
+              <a:t>PostgreSQL database called sweetverse_db</a:t>
+            </a:r>
+          </a:p>
+        </p:txBody>
+      </p:sp>
+    </p:spTree>
+    <p:extLst>
+      <p:ext uri="{BB962C8B-B14F-4D97-AF65-F5344CB8AC3E}">
+        <p14:creationId xmlns:p14="http://schemas.microsoft.com/office/powerpoint/2010/main" val="2136024907"/>
+      </p:ext>
+    </p:extLst>
+  </p:cSld>
+  <p:clrMapOvr>
+    <a:masterClrMapping/>
+  </p:clrMapOvr>
+  <p:timing>
+    <p:tnLst>
+      <p:par>
+        <p:cTn id="1" dur="indefinite" restart="never" nodeType="tmRoot">
+          <p:childTnLst>
+            <p:seq concurrent="1" nextAc="seek">
+              <p:cTn id="2" dur="indefinite" nodeType="mainSeq">
+                <p:childTnLst>
+                  <p:par>
+                    <p:cTn id="3" fill="hold">
+                      <p:stCondLst>
+                        <p:cond delay="indefinite"/>
+                        <p:cond evt="onBegin" delay="0">
+                          <p:tn val="2"/>
+                        </p:cond>
+                      </p:stCondLst>
+                      <p:childTnLst>
+                        <p:par>
+                          <p:cTn id="4" fill="hold">
+                            <p:stCondLst>
+                              <p:cond delay="0"/>
+                            </p:stCondLst>
+                            <p:childTnLst>
+                              <p:par>
+                                <p:cTn id="5" presetID="10" presetClass="entr" presetSubtype="0" fill="hold" grpId="0" nodeType="withEffect">
+                                  <p:stCondLst>
+                                    <p:cond delay="500"/>
+                                  </p:stCondLst>
+                                  <p:iterate type="wd">
+                                    <p:tmPct val="15000"/>
+                                  </p:iterate>
+                                  <p:childTnLst>
+                                    <p:set>
+                                      <p:cBhvr>
+                                        <p:cTn id="6" dur="1" fill="hold">
+                                          <p:stCondLst>
+                                            <p:cond delay="0"/>
+                                          </p:stCondLst>
+                                        </p:cTn>
+                                        <p:tgtEl>
+                                          <p:spTgt spid="2"/>
+                                        </p:tgtEl>
+                                        <p:attrNameLst>
+                                          <p:attrName>style.visibility</p:attrName>
+                                        </p:attrNameLst>
+                                      </p:cBhvr>
+                                      <p:to>
+                                        <p:strVal val="visible"/>
+                                      </p:to>
+                                    </p:set>
+                                    <p:animEffect transition="in" filter="fade">
+                                      <p:cBhvr>
+                                        <p:cTn id="7" dur="1000"/>
+                                        <p:tgtEl>
+                                          <p:spTgt spid="2"/>
+                                        </p:tgtEl>
+                                      </p:cBhvr>
+                                    </p:animEffect>
+                                  </p:childTnLst>
+                                </p:cTn>
+                              </p:par>
+                            </p:childTnLst>
+                          </p:cTn>
+                        </p:par>
+                      </p:childTnLst>
+                    </p:cTn>
+                  </p:par>
+                </p:childTnLst>
+              </p:cTn>
+              <p:prevCondLst>
+                <p:cond evt="onPrev" delay="0">
+                  <p:tgtEl>
+                    <p:sldTgt/>
+                  </p:tgtEl>
+                </p:cond>
+              </p:prevCondLst>
+              <p:nextCondLst>
+                <p:cond evt="onNext" delay="0">
+                  <p:tgtEl>
+                    <p:sldTgt/>
+                  </p:tgtEl>
+                </p:cond>
+              </p:nextCondLst>
+            </p:seq>
+          </p:childTnLst>
+        </p:cTn>
+      </p:par>
+    </p:tnLst>
+    <p:bldLst>
+      <p:bldP spid="2" grpId="0"/>
+    </p:bldLst>
+  </p:timing>
+</p:sld>
+</file>
+
+<file path=ppt/slides/slide4.xml><?xml version="1.0" encoding="utf-8"?>
+<p:sld xmlns:a="http://schemas.openxmlformats.org/drawingml/2006/main" xmlns:r="http://schemas.openxmlformats.org/officeDocument/2006/relationships" xmlns:p="http://schemas.openxmlformats.org/presentationml/2006/main">
+  <p:cSld>
+    <p:bg>
+      <p:bgPr>
+        <a:solidFill>
+          <a:schemeClr val="bg1"/>
+        </a:solidFill>
+        <a:effectLst/>
+      </p:bgPr>
+    </p:bg>
+    <p:spTree>
+      <p:nvGrpSpPr>
+        <p:cNvPr id="1" name=""/>
+        <p:cNvGrpSpPr/>
+        <p:nvPr/>
+      </p:nvGrpSpPr>
+      <p:grpSpPr>
+        <a:xfrm>
+          <a:off x="0" y="0"/>
+          <a:ext cx="0" cy="0"/>
+          <a:chOff x="0" y="0"/>
+          <a:chExt cx="0" cy="0"/>
+        </a:xfrm>
+      </p:grpSpPr>
+      <p:sp>
+        <p:nvSpPr>
+          <p:cNvPr id="23" name="Rectangle 22">
+            <a:extLst>
+              <a:ext uri="{FF2B5EF4-FFF2-40B4-BE49-F238E27FC236}">
+                <a16:creationId xmlns:a16="http://schemas.microsoft.com/office/drawing/2014/main" id="{A4AC5506-6312-4701-8D3C-40187889A947}"/>
+              </a:ext>
+              <a:ext uri="{C183D7F6-B498-43B3-948B-1728B52AA6E4}">
+                <adec:decorative xmlns:adec="http://schemas.microsoft.com/office/drawing/2017/decorative" val="1"/>
+              </a:ext>
+            </a:extLst>
+          </p:cNvPr>
+          <p:cNvSpPr>
+            <a:spLocks noGrp="1" noRot="1" noChangeAspect="1" noMove="1" noResize="1" noEditPoints="1" noAdjustHandles="1" noChangeArrowheads="1" noChangeShapeType="1" noTextEdit="1"/>
+          </p:cNvSpPr>
+          <p:nvPr>
+            <p:extLst>
+              <p:ext uri="{386F3935-93C4-4BCD-93E2-E3B085C9AB24}">
+                <p16:designElem xmlns:p16="http://schemas.microsoft.com/office/powerpoint/2015/main" val="1"/>
+              </p:ext>
+            </p:extLst>
+          </p:nvPr>
+        </p:nvSpPr>
+        <p:spPr>
+          <a:xfrm>
+            <a:off x="0" y="651752"/>
+            <a:ext cx="12192000" cy="736551"/>
+          </a:xfrm>
+          <a:prstGeom prst="rect">
+            <a:avLst/>
+          </a:prstGeom>
+          <a:solidFill>
+            <a:schemeClr val="tx1"/>
+          </a:solidFill>
+          <a:ln>
+            <a:noFill/>
+          </a:ln>
+        </p:spPr>
+        <p:style>
+          <a:lnRef idx="2">
+            <a:schemeClr val="accent1">
+              <a:shade val="50000"/>
+            </a:schemeClr>
+          </a:lnRef>
+          <a:fillRef idx="1">
+            <a:schemeClr val="accent1"/>
+          </a:fillRef>
+          <a:effectRef idx="0">
+            <a:schemeClr val="accent1"/>
+          </a:effectRef>
+          <a:fontRef idx="minor">
+            <a:schemeClr val="lt1"/>
+          </a:fontRef>
+        </p:style>
+        <p:txBody>
+          <a:bodyPr rtlCol="0" anchor="ctr"/>
+          <a:lstStyle/>
+          <a:p>
+            <a:pPr algn="ctr"/>
+            <a:endParaRPr lang="en-US"/>
+          </a:p>
+        </p:txBody>
+      </p:sp>
+      <p:sp>
+        <p:nvSpPr>
+          <p:cNvPr id="2" name="Title 1">
+            <a:extLst>
+              <a:ext uri="{FF2B5EF4-FFF2-40B4-BE49-F238E27FC236}">
                 <a16:creationId xmlns:a16="http://schemas.microsoft.com/office/drawing/2014/main" id="{F86A2858-5DCD-E0A2-B5CC-8A778CF649F7}"/>
               </a:ext>
             </a:extLst>
@@ -3521,13 +7096,28 @@
             <p:ph type="title"/>
           </p:nvPr>
         </p:nvSpPr>
-        <p:spPr/>
-        <p:txBody>
-          <a:bodyPr/>
+        <p:spPr>
+          <a:xfrm>
+            <a:off x="556532" y="643467"/>
+            <a:ext cx="11210925" cy="744836"/>
+          </a:xfrm>
+        </p:spPr>
+        <p:txBody>
+          <a:bodyPr vert="horz" lIns="91440" tIns="45720" rIns="91440" bIns="45720" rtlCol="0" anchor="ctr">
+            <a:normAutofit/>
+          </a:bodyPr>
           <a:lstStyle/>
           <a:p>
+            <a:pPr algn="ctr"/>
             <a:r>
-              <a:rPr lang="en-US" dirty="0"/>
+              <a:rPr lang="en-US" sz="3200" kern="1200">
+                <a:solidFill>
+                  <a:schemeClr val="bg1"/>
+                </a:solidFill>
+                <a:latin typeface="+mj-lt"/>
+                <a:ea typeface="+mj-ea"/>
+                <a:cs typeface="+mj-cs"/>
+              </a:rPr>
               <a:t>Tables</a:t>
             </a:r>
           </a:p>
@@ -3557,8 +7147,8 @@
         </p:blipFill>
         <p:spPr>
           <a:xfrm>
-            <a:off x="1159329" y="1387761"/>
-            <a:ext cx="8576342" cy="4540417"/>
+            <a:off x="1945923" y="1675227"/>
+            <a:ext cx="8300153" cy="4394199"/>
           </a:xfrm>
           <a:prstGeom prst="rect">
             <a:avLst/>
@@ -3578,9 +7168,17 @@
 </p:sld>
 </file>
 
-<file path=ppt/slides/slide4.xml><?xml version="1.0" encoding="utf-8"?>
+<file path=ppt/slides/slide5.xml><?xml version="1.0" encoding="utf-8"?>
 <p:sld xmlns:a="http://schemas.openxmlformats.org/drawingml/2006/main" xmlns:r="http://schemas.openxmlformats.org/officeDocument/2006/relationships" xmlns:p="http://schemas.openxmlformats.org/presentationml/2006/main">
   <p:cSld>
+    <p:bg>
+      <p:bgPr>
+        <a:solidFill>
+          <a:schemeClr val="bg1"/>
+        </a:solidFill>
+        <a:effectLst/>
+      </p:bgPr>
+    </p:bg>
     <p:spTree>
       <p:nvGrpSpPr>
         <p:cNvPr id="1" name=""/>
@@ -3597,6 +7195,72 @@
       </p:grpSpPr>
       <p:sp>
         <p:nvSpPr>
+          <p:cNvPr id="23" name="Rectangle 22">
+            <a:extLst>
+              <a:ext uri="{FF2B5EF4-FFF2-40B4-BE49-F238E27FC236}">
+                <a16:creationId xmlns:a16="http://schemas.microsoft.com/office/drawing/2014/main" id="{C3896A03-3945-419A-B66B-4EE266EDD152}"/>
+              </a:ext>
+              <a:ext uri="{C183D7F6-B498-43B3-948B-1728B52AA6E4}">
+                <adec:decorative xmlns:adec="http://schemas.microsoft.com/office/drawing/2017/decorative" val="1"/>
+              </a:ext>
+            </a:extLst>
+          </p:cNvPr>
+          <p:cNvSpPr>
+            <a:spLocks noGrp="1" noRot="1" noChangeAspect="1" noMove="1" noResize="1" noEditPoints="1" noAdjustHandles="1" noChangeArrowheads="1" noChangeShapeType="1" noTextEdit="1"/>
+          </p:cNvSpPr>
+          <p:nvPr>
+            <p:extLst>
+              <p:ext uri="{386F3935-93C4-4BCD-93E2-E3B085C9AB24}">
+                <p16:designElem xmlns:p16="http://schemas.microsoft.com/office/powerpoint/2015/main" val="1"/>
+              </p:ext>
+            </p:extLst>
+          </p:nvPr>
+        </p:nvSpPr>
+        <p:spPr>
+          <a:xfrm>
+            <a:off x="10" y="0"/>
+            <a:ext cx="4654285" cy="6858001"/>
+          </a:xfrm>
+          <a:prstGeom prst="rect">
+            <a:avLst/>
+          </a:prstGeom>
+          <a:solidFill>
+            <a:schemeClr val="tx1">
+              <a:lumMod val="85000"/>
+              <a:lumOff val="15000"/>
+            </a:schemeClr>
+          </a:solidFill>
+          <a:ln>
+            <a:noFill/>
+          </a:ln>
+        </p:spPr>
+        <p:style>
+          <a:lnRef idx="2">
+            <a:schemeClr val="accent1">
+              <a:shade val="50000"/>
+            </a:schemeClr>
+          </a:lnRef>
+          <a:fillRef idx="1">
+            <a:schemeClr val="accent1"/>
+          </a:fillRef>
+          <a:effectRef idx="0">
+            <a:schemeClr val="accent1"/>
+          </a:effectRef>
+          <a:fontRef idx="minor">
+            <a:schemeClr val="lt1"/>
+          </a:fontRef>
+        </p:style>
+        <p:txBody>
+          <a:bodyPr rtlCol="0" anchor="ctr"/>
+          <a:lstStyle/>
+          <a:p>
+            <a:pPr algn="ctr"/>
+            <a:endParaRPr lang="en-US"/>
+          </a:p>
+        </p:txBody>
+      </p:sp>
+      <p:sp>
+        <p:nvSpPr>
           <p:cNvPr id="2" name="Title 1">
             <a:extLst>
               <a:ext uri="{FF2B5EF4-FFF2-40B4-BE49-F238E27FC236}">
@@ -3611,13 +7275,24 @@
             <p:ph type="title"/>
           </p:nvPr>
         </p:nvSpPr>
-        <p:spPr/>
-        <p:txBody>
-          <a:bodyPr/>
+        <p:spPr>
+          <a:xfrm>
+            <a:off x="1156851" y="637762"/>
+            <a:ext cx="2898276" cy="5576770"/>
+          </a:xfrm>
+        </p:spPr>
+        <p:txBody>
+          <a:bodyPr anchor="t">
+            <a:normAutofit/>
+          </a:bodyPr>
           <a:lstStyle/>
           <a:p>
             <a:r>
-              <a:rPr lang="en-US" dirty="0"/>
+              <a:rPr lang="en-US" sz="4100">
+                <a:solidFill>
+                  <a:schemeClr val="bg1"/>
+                </a:solidFill>
+              </a:rPr>
               <a:t>Many-to-Many Relationship</a:t>
             </a:r>
           </a:p>
@@ -3625,6 +7300,134 @@
       </p:sp>
       <p:sp>
         <p:nvSpPr>
+          <p:cNvPr id="25" name="Rectangle 24">
+            <a:extLst>
+              <a:ext uri="{FF2B5EF4-FFF2-40B4-BE49-F238E27FC236}">
+                <a16:creationId xmlns:a16="http://schemas.microsoft.com/office/drawing/2014/main" id="{B34F5AD2-EDBD-4BBD-A55C-EAFFD0C7097A}"/>
+              </a:ext>
+              <a:ext uri="{C183D7F6-B498-43B3-948B-1728B52AA6E4}">
+                <adec:decorative xmlns:adec="http://schemas.microsoft.com/office/drawing/2017/decorative" val="1"/>
+              </a:ext>
+            </a:extLst>
+          </p:cNvPr>
+          <p:cNvSpPr>
+            <a:spLocks noGrp="1" noRot="1" noChangeAspect="1" noMove="1" noResize="1" noEditPoints="1" noAdjustHandles="1" noChangeArrowheads="1" noChangeShapeType="1" noTextEdit="1"/>
+          </p:cNvSpPr>
+          <p:nvPr>
+            <p:extLst>
+              <p:ext uri="{386F3935-93C4-4BCD-93E2-E3B085C9AB24}">
+                <p16:designElem xmlns:p16="http://schemas.microsoft.com/office/powerpoint/2015/main" val="1"/>
+              </p:ext>
+            </p:extLst>
+          </p:nvPr>
+        </p:nvSpPr>
+        <p:spPr>
+          <a:xfrm>
+            <a:off x="4652535" y="0"/>
+            <a:ext cx="7539455" cy="6858001"/>
+          </a:xfrm>
+          <a:prstGeom prst="rect">
+            <a:avLst/>
+          </a:prstGeom>
+          <a:solidFill>
+            <a:schemeClr val="bg1">
+              <a:lumMod val="95000"/>
+            </a:schemeClr>
+          </a:solidFill>
+          <a:ln>
+            <a:noFill/>
+          </a:ln>
+        </p:spPr>
+        <p:style>
+          <a:lnRef idx="2">
+            <a:schemeClr val="accent1">
+              <a:shade val="50000"/>
+            </a:schemeClr>
+          </a:lnRef>
+          <a:fillRef idx="1">
+            <a:schemeClr val="accent1"/>
+          </a:fillRef>
+          <a:effectRef idx="0">
+            <a:schemeClr val="accent1"/>
+          </a:effectRef>
+          <a:fontRef idx="minor">
+            <a:schemeClr val="lt1"/>
+          </a:fontRef>
+        </p:style>
+        <p:txBody>
+          <a:bodyPr rtlCol="0" anchor="ctr"/>
+          <a:lstStyle/>
+          <a:p>
+            <a:pPr algn="ctr"/>
+            <a:endParaRPr lang="en-US"/>
+          </a:p>
+        </p:txBody>
+      </p:sp>
+      <p:sp>
+        <p:nvSpPr>
+          <p:cNvPr id="27" name="Rectangle 26">
+            <a:extLst>
+              <a:ext uri="{FF2B5EF4-FFF2-40B4-BE49-F238E27FC236}">
+                <a16:creationId xmlns:a16="http://schemas.microsoft.com/office/drawing/2014/main" id="{B8EAE243-3A9F-4A46-B0D9-04C723A8A1BD}"/>
+              </a:ext>
+              <a:ext uri="{C183D7F6-B498-43B3-948B-1728B52AA6E4}">
+                <adec:decorative xmlns:adec="http://schemas.microsoft.com/office/drawing/2017/decorative" val="1"/>
+              </a:ext>
+            </a:extLst>
+          </p:cNvPr>
+          <p:cNvSpPr>
+            <a:spLocks noGrp="1" noRot="1" noChangeAspect="1" noMove="1" noResize="1" noEditPoints="1" noAdjustHandles="1" noChangeArrowheads="1" noChangeShapeType="1" noTextEdit="1"/>
+          </p:cNvSpPr>
+          <p:nvPr>
+            <p:extLst>
+              <p:ext uri="{386F3935-93C4-4BCD-93E2-E3B085C9AB24}">
+                <p16:designElem xmlns:p16="http://schemas.microsoft.com/office/powerpoint/2015/main" val="1"/>
+              </p:ext>
+            </p:extLst>
+          </p:nvPr>
+        </p:nvSpPr>
+        <p:spPr>
+          <a:xfrm>
+            <a:off x="5439977" y="643465"/>
+            <a:ext cx="457200" cy="45720"/>
+          </a:xfrm>
+          <a:prstGeom prst="rect">
+            <a:avLst/>
+          </a:prstGeom>
+          <a:solidFill>
+            <a:schemeClr val="tx1"/>
+          </a:solidFill>
+          <a:ln>
+            <a:noFill/>
+          </a:ln>
+        </p:spPr>
+        <p:style>
+          <a:lnRef idx="2">
+            <a:schemeClr val="accent1">
+              <a:shade val="50000"/>
+            </a:schemeClr>
+          </a:lnRef>
+          <a:fillRef idx="1">
+            <a:schemeClr val="accent1"/>
+          </a:fillRef>
+          <a:effectRef idx="0">
+            <a:schemeClr val="accent1"/>
+          </a:effectRef>
+          <a:fontRef idx="minor">
+            <a:schemeClr val="lt1"/>
+          </a:fontRef>
+        </p:style>
+        <p:txBody>
+          <a:bodyPr rtlCol="0" anchor="ctr"/>
+          <a:lstStyle/>
+          <a:p>
+            <a:pPr algn="ctr"/>
+            <a:endParaRPr lang="en-US"/>
+          </a:p>
+        </p:txBody>
+      </p:sp>
+      <p:sp>
+        <p:nvSpPr>
           <p:cNvPr id="3" name="Content Placeholder 2">
             <a:extLst>
               <a:ext uri="{FF2B5EF4-FFF2-40B4-BE49-F238E27FC236}">
@@ -3639,25 +7442,32 @@
             <p:ph idx="1"/>
           </p:nvPr>
         </p:nvSpPr>
-        <p:spPr/>
-        <p:txBody>
-          <a:bodyPr/>
+        <p:spPr>
+          <a:xfrm>
+            <a:off x="5439976" y="850052"/>
+            <a:ext cx="5605373" cy="5326911"/>
+          </a:xfrm>
+        </p:spPr>
+        <p:txBody>
+          <a:bodyPr>
+            <a:normAutofit/>
+          </a:bodyPr>
           <a:lstStyle/>
           <a:p>
             <a:r>
-              <a:rPr lang="en-US" dirty="0"/>
+              <a:rPr lang="en-US" sz="2400"/>
               <a:t>CustomerOrders</a:t>
             </a:r>
           </a:p>
           <a:p>
             <a:r>
-              <a:rPr lang="en-US" dirty="0"/>
+              <a:rPr lang="en-US" sz="2400"/>
               <a:t>Products</a:t>
             </a:r>
           </a:p>
           <a:p>
             <a:r>
-              <a:rPr lang="en-US" dirty="0"/>
+              <a:rPr lang="en-US" sz="2400"/>
               <a:t>OrderItems - Junction</a:t>
             </a:r>
           </a:p>
@@ -3676,9 +7486,17 @@
 </p:sld>
 </file>
 
-<file path=ppt/slides/slide5.xml><?xml version="1.0" encoding="utf-8"?>
+<file path=ppt/slides/slide6.xml><?xml version="1.0" encoding="utf-8"?>
 <p:sld xmlns:a="http://schemas.openxmlformats.org/drawingml/2006/main" xmlns:r="http://schemas.openxmlformats.org/officeDocument/2006/relationships" xmlns:p="http://schemas.openxmlformats.org/presentationml/2006/main">
   <p:cSld>
+    <p:bg>
+      <p:bgPr>
+        <a:solidFill>
+          <a:schemeClr val="bg1"/>
+        </a:solidFill>
+        <a:effectLst/>
+      </p:bgPr>
+    </p:bg>
     <p:spTree>
       <p:nvGrpSpPr>
         <p:cNvPr id="1" name=""/>
@@ -3695,6 +7513,72 @@
       </p:grpSpPr>
       <p:sp>
         <p:nvSpPr>
+          <p:cNvPr id="33" name="Rectangle 32">
+            <a:extLst>
+              <a:ext uri="{FF2B5EF4-FFF2-40B4-BE49-F238E27FC236}">
+                <a16:creationId xmlns:a16="http://schemas.microsoft.com/office/drawing/2014/main" id="{C3896A03-3945-419A-B66B-4EE266EDD152}"/>
+              </a:ext>
+              <a:ext uri="{C183D7F6-B498-43B3-948B-1728B52AA6E4}">
+                <adec:decorative xmlns:adec="http://schemas.microsoft.com/office/drawing/2017/decorative" val="1"/>
+              </a:ext>
+            </a:extLst>
+          </p:cNvPr>
+          <p:cNvSpPr>
+            <a:spLocks noGrp="1" noRot="1" noChangeAspect="1" noMove="1" noResize="1" noEditPoints="1" noAdjustHandles="1" noChangeArrowheads="1" noChangeShapeType="1" noTextEdit="1"/>
+          </p:cNvSpPr>
+          <p:nvPr>
+            <p:extLst>
+              <p:ext uri="{386F3935-93C4-4BCD-93E2-E3B085C9AB24}">
+                <p16:designElem xmlns:p16="http://schemas.microsoft.com/office/powerpoint/2015/main" val="1"/>
+              </p:ext>
+            </p:extLst>
+          </p:nvPr>
+        </p:nvSpPr>
+        <p:spPr>
+          <a:xfrm>
+            <a:off x="10" y="0"/>
+            <a:ext cx="4654285" cy="6858001"/>
+          </a:xfrm>
+          <a:prstGeom prst="rect">
+            <a:avLst/>
+          </a:prstGeom>
+          <a:solidFill>
+            <a:schemeClr val="tx1">
+              <a:lumMod val="85000"/>
+              <a:lumOff val="15000"/>
+            </a:schemeClr>
+          </a:solidFill>
+          <a:ln>
+            <a:noFill/>
+          </a:ln>
+        </p:spPr>
+        <p:style>
+          <a:lnRef idx="2">
+            <a:schemeClr val="accent1">
+              <a:shade val="50000"/>
+            </a:schemeClr>
+          </a:lnRef>
+          <a:fillRef idx="1">
+            <a:schemeClr val="accent1"/>
+          </a:fillRef>
+          <a:effectRef idx="0">
+            <a:schemeClr val="accent1"/>
+          </a:effectRef>
+          <a:fontRef idx="minor">
+            <a:schemeClr val="lt1"/>
+          </a:fontRef>
+        </p:style>
+        <p:txBody>
+          <a:bodyPr rtlCol="0" anchor="ctr"/>
+          <a:lstStyle/>
+          <a:p>
+            <a:pPr algn="ctr"/>
+            <a:endParaRPr lang="en-US"/>
+          </a:p>
+        </p:txBody>
+      </p:sp>
+      <p:sp>
+        <p:nvSpPr>
           <p:cNvPr id="2" name="Title 1">
             <a:extLst>
               <a:ext uri="{FF2B5EF4-FFF2-40B4-BE49-F238E27FC236}">
@@ -3709,13 +7593,24 @@
             <p:ph type="title"/>
           </p:nvPr>
         </p:nvSpPr>
-        <p:spPr/>
-        <p:txBody>
-          <a:bodyPr/>
+        <p:spPr>
+          <a:xfrm>
+            <a:off x="1156851" y="637762"/>
+            <a:ext cx="2898276" cy="5576770"/>
+          </a:xfrm>
+        </p:spPr>
+        <p:txBody>
+          <a:bodyPr anchor="t">
+            <a:normAutofit/>
+          </a:bodyPr>
           <a:lstStyle/>
           <a:p>
             <a:r>
-              <a:rPr lang="en-US" dirty="0"/>
+              <a:rPr lang="en-US">
+                <a:solidFill>
+                  <a:schemeClr val="bg1"/>
+                </a:solidFill>
+              </a:rPr>
               <a:t>Demo</a:t>
             </a:r>
           </a:p>
@@ -3723,38 +7618,100 @@
       </p:sp>
       <p:sp>
         <p:nvSpPr>
-          <p:cNvPr id="3" name="Content Placeholder 2">
-            <a:extLst>
-              <a:ext uri="{FF2B5EF4-FFF2-40B4-BE49-F238E27FC236}">
-                <a16:creationId xmlns:a16="http://schemas.microsoft.com/office/drawing/2014/main" id="{9C5FDC9A-130C-7A0C-6BA8-9AD6BFC7FDD3}"/>
-              </a:ext>
-            </a:extLst>
-          </p:cNvPr>
-          <p:cNvSpPr>
-            <a:spLocks noGrp="1"/>
-          </p:cNvSpPr>
+          <p:cNvPr id="35" name="Rectangle 34">
+            <a:extLst>
+              <a:ext uri="{FF2B5EF4-FFF2-40B4-BE49-F238E27FC236}">
+                <a16:creationId xmlns:a16="http://schemas.microsoft.com/office/drawing/2014/main" id="{B34F5AD2-EDBD-4BBD-A55C-EAFFD0C7097A}"/>
+              </a:ext>
+              <a:ext uri="{C183D7F6-B498-43B3-948B-1728B52AA6E4}">
+                <adec:decorative xmlns:adec="http://schemas.microsoft.com/office/drawing/2017/decorative" val="1"/>
+              </a:ext>
+            </a:extLst>
+          </p:cNvPr>
+          <p:cNvSpPr>
+            <a:spLocks noGrp="1" noRot="1" noChangeAspect="1" noMove="1" noResize="1" noEditPoints="1" noAdjustHandles="1" noChangeArrowheads="1" noChangeShapeType="1" noTextEdit="1"/>
+          </p:cNvSpPr>
+          <p:nvPr>
+            <p:extLst>
+              <p:ext uri="{386F3935-93C4-4BCD-93E2-E3B085C9AB24}">
+                <p16:designElem xmlns:p16="http://schemas.microsoft.com/office/powerpoint/2015/main" val="1"/>
+              </p:ext>
+            </p:extLst>
+          </p:nvPr>
+        </p:nvSpPr>
+        <p:spPr>
+          <a:xfrm>
+            <a:off x="4652535" y="0"/>
+            <a:ext cx="7539455" cy="6858001"/>
+          </a:xfrm>
+          <a:prstGeom prst="rect">
+            <a:avLst/>
+          </a:prstGeom>
+          <a:solidFill>
+            <a:schemeClr val="bg1">
+              <a:lumMod val="95000"/>
+            </a:schemeClr>
+          </a:solidFill>
+          <a:ln>
+            <a:noFill/>
+          </a:ln>
+        </p:spPr>
+        <p:style>
+          <a:lnRef idx="2">
+            <a:schemeClr val="accent1">
+              <a:shade val="50000"/>
+            </a:schemeClr>
+          </a:lnRef>
+          <a:fillRef idx="1">
+            <a:schemeClr val="accent1"/>
+          </a:fillRef>
+          <a:effectRef idx="0">
+            <a:schemeClr val="accent1"/>
+          </a:effectRef>
+          <a:fontRef idx="minor">
+            <a:schemeClr val="lt1"/>
+          </a:fontRef>
+        </p:style>
+        <p:txBody>
+          <a:bodyPr rtlCol="0" anchor="ctr"/>
+          <a:lstStyle/>
+          <a:p>
+            <a:pPr algn="ctr"/>
+            <a:endParaRPr lang="en-US"/>
+          </a:p>
+        </p:txBody>
+      </p:sp>
+      <p:graphicFrame>
+        <p:nvGraphicFramePr>
+          <p:cNvPr id="28" name="Content Placeholder 2">
+            <a:extLst>
+              <a:ext uri="{FF2B5EF4-FFF2-40B4-BE49-F238E27FC236}">
+                <a16:creationId xmlns:a16="http://schemas.microsoft.com/office/drawing/2014/main" id="{CBCB4902-786A-C293-2D51-964FBCD0C552}"/>
+              </a:ext>
+            </a:extLst>
+          </p:cNvPr>
+          <p:cNvGraphicFramePr>
+            <a:graphicFrameLocks noGrp="1"/>
+          </p:cNvGraphicFramePr>
           <p:nvPr>
             <p:ph idx="1"/>
-          </p:nvPr>
-        </p:nvSpPr>
-        <p:spPr/>
-        <p:txBody>
-          <a:bodyPr/>
-          <a:lstStyle/>
-          <a:p>
-            <a:r>
-              <a:rPr lang="en-US" dirty="0"/>
-              <a:t>Application</a:t>
-            </a:r>
-          </a:p>
-          <a:p>
-            <a:r>
-              <a:rPr lang="en-US" dirty="0"/>
-              <a:t>Test Cases</a:t>
-            </a:r>
-          </a:p>
-        </p:txBody>
-      </p:sp>
+            <p:extLst>
+              <p:ext uri="{D42A27DB-BD31-4B8C-83A1-F6EECF244321}">
+                <p14:modId xmlns:p14="http://schemas.microsoft.com/office/powerpoint/2010/main" val="1945455303"/>
+              </p:ext>
+            </p:extLst>
+          </p:nvPr>
+        </p:nvGraphicFramePr>
+        <p:xfrm>
+          <a:off x="5439954" y="637762"/>
+          <a:ext cx="5605401" cy="5539201"/>
+        </p:xfrm>
+        <a:graphic>
+          <a:graphicData uri="http://schemas.openxmlformats.org/drawingml/2006/diagram">
+            <dgm:relIds xmlns:dgm="http://schemas.openxmlformats.org/drawingml/2006/diagram" xmlns:r="http://schemas.openxmlformats.org/officeDocument/2006/relationships" r:dm="rId2" r:lo="rId3" r:qs="rId4" r:cs="rId5"/>
+          </a:graphicData>
+        </a:graphic>
+      </p:graphicFrame>
     </p:spTree>
     <p:extLst>
       <p:ext uri="{BB962C8B-B14F-4D97-AF65-F5344CB8AC3E}">
@@ -3768,9 +7725,17 @@
 </p:sld>
 </file>
 
-<file path=ppt/slides/slide6.xml><?xml version="1.0" encoding="utf-8"?>
+<file path=ppt/slides/slide7.xml><?xml version="1.0" encoding="utf-8"?>
 <p:sld xmlns:a="http://schemas.openxmlformats.org/drawingml/2006/main" xmlns:r="http://schemas.openxmlformats.org/officeDocument/2006/relationships" xmlns:p="http://schemas.openxmlformats.org/presentationml/2006/main">
   <p:cSld>
+    <p:bg>
+      <p:bgPr>
+        <a:solidFill>
+          <a:schemeClr val="bg1"/>
+        </a:solidFill>
+        <a:effectLst/>
+      </p:bgPr>
+    </p:bg>
     <p:spTree>
       <p:nvGrpSpPr>
         <p:cNvPr id="1" name=""/>
@@ -3787,35 +7752,205 @@
       </p:grpSpPr>
       <p:sp>
         <p:nvSpPr>
-          <p:cNvPr id="2" name="Title 1">
-            <a:extLst>
-              <a:ext uri="{FF2B5EF4-FFF2-40B4-BE49-F238E27FC236}">
-                <a16:creationId xmlns:a16="http://schemas.microsoft.com/office/drawing/2014/main" id="{CA1B57B7-319F-45F0-2A5E-5B6EEEF39C32}"/>
-              </a:ext>
-            </a:extLst>
-          </p:cNvPr>
-          <p:cNvSpPr>
-            <a:spLocks noGrp="1"/>
-          </p:cNvSpPr>
-          <p:nvPr>
-            <p:ph type="title"/>
+          <p:cNvPr id="29" name="Rectangle 28">
+            <a:extLst>
+              <a:ext uri="{FF2B5EF4-FFF2-40B4-BE49-F238E27FC236}">
+                <a16:creationId xmlns:a16="http://schemas.microsoft.com/office/drawing/2014/main" id="{C3896A03-3945-419A-B66B-4EE266EDD152}"/>
+              </a:ext>
+              <a:ext uri="{C183D7F6-B498-43B3-948B-1728B52AA6E4}">
+                <adec:decorative xmlns:adec="http://schemas.microsoft.com/office/drawing/2017/decorative" val="1"/>
+              </a:ext>
+            </a:extLst>
+          </p:cNvPr>
+          <p:cNvSpPr>
+            <a:spLocks noGrp="1" noRot="1" noChangeAspect="1" noMove="1" noResize="1" noEditPoints="1" noAdjustHandles="1" noChangeArrowheads="1" noChangeShapeType="1" noTextEdit="1"/>
+          </p:cNvSpPr>
+          <p:nvPr>
+            <p:extLst>
+              <p:ext uri="{386F3935-93C4-4BCD-93E2-E3B085C9AB24}">
+                <p16:designElem xmlns:p16="http://schemas.microsoft.com/office/powerpoint/2015/main" val="1"/>
+              </p:ext>
+            </p:extLst>
           </p:nvPr>
         </p:nvSpPr>
         <p:spPr>
           <a:xfrm>
-            <a:off x="838200" y="2766218"/>
-            <a:ext cx="10515600" cy="1325563"/>
+            <a:off x="10" y="0"/>
+            <a:ext cx="6083447" cy="6858001"/>
+          </a:xfrm>
+          <a:prstGeom prst="rect">
+            <a:avLst/>
+          </a:prstGeom>
+          <a:solidFill>
+            <a:schemeClr val="tx1">
+              <a:lumMod val="85000"/>
+              <a:lumOff val="15000"/>
+            </a:schemeClr>
+          </a:solidFill>
+          <a:ln>
+            <a:noFill/>
+          </a:ln>
+        </p:spPr>
+        <p:style>
+          <a:lnRef idx="2">
+            <a:schemeClr val="accent1">
+              <a:shade val="50000"/>
+            </a:schemeClr>
+          </a:lnRef>
+          <a:fillRef idx="1">
+            <a:schemeClr val="accent1"/>
+          </a:fillRef>
+          <a:effectRef idx="0">
+            <a:schemeClr val="accent1"/>
+          </a:effectRef>
+          <a:fontRef idx="minor">
+            <a:schemeClr val="lt1"/>
+          </a:fontRef>
+        </p:style>
+        <p:txBody>
+          <a:bodyPr rtlCol="0" anchor="ctr"/>
+          <a:lstStyle/>
+          <a:p>
+            <a:pPr algn="ctr"/>
+            <a:endParaRPr lang="en-US"/>
+          </a:p>
+        </p:txBody>
+      </p:sp>
+      <p:sp>
+        <p:nvSpPr>
+          <p:cNvPr id="2" name="Title 1">
+            <a:extLst>
+              <a:ext uri="{FF2B5EF4-FFF2-40B4-BE49-F238E27FC236}">
+                <a16:creationId xmlns:a16="http://schemas.microsoft.com/office/drawing/2014/main" id="{CA1B57B7-319F-45F0-2A5E-5B6EEEF39C32}"/>
+              </a:ext>
+            </a:extLst>
+          </p:cNvPr>
+          <p:cNvSpPr>
+            <a:spLocks noGrp="1"/>
+          </p:cNvSpPr>
+          <p:nvPr>
+            <p:ph type="title"/>
+          </p:nvPr>
+        </p:nvSpPr>
+        <p:spPr>
+          <a:xfrm>
+            <a:off x="1155558" y="637762"/>
+            <a:ext cx="4284397" cy="5576770"/>
           </a:xfrm>
         </p:spPr>
         <p:txBody>
-          <a:bodyPr/>
+          <a:bodyPr vert="horz" lIns="91440" tIns="45720" rIns="91440" bIns="45720" rtlCol="0" anchor="ctr">
+            <a:normAutofit/>
+          </a:bodyPr>
           <a:lstStyle/>
           <a:p>
-            <a:pPr algn="ctr"/>
             <a:r>
-              <a:rPr lang="en-US" dirty="0"/>
+              <a:rPr lang="en-US" sz="6600" kern="1200">
+                <a:solidFill>
+                  <a:schemeClr val="bg1"/>
+                </a:solidFill>
+                <a:latin typeface="+mj-lt"/>
+                <a:ea typeface="+mj-ea"/>
+                <a:cs typeface="+mj-cs"/>
+              </a:rPr>
               <a:t>Thank you</a:t>
             </a:r>
+            <a:br>
+              <a:rPr lang="en-US" sz="6600" kern="1200">
+                <a:solidFill>
+                  <a:schemeClr val="bg1"/>
+                </a:solidFill>
+                <a:latin typeface="+mj-lt"/>
+                <a:ea typeface="+mj-ea"/>
+                <a:cs typeface="+mj-cs"/>
+              </a:rPr>
+            </a:br>
+            <a:br>
+              <a:rPr lang="en-US" sz="6600" kern="1200">
+                <a:solidFill>
+                  <a:schemeClr val="bg1"/>
+                </a:solidFill>
+                <a:latin typeface="+mj-lt"/>
+                <a:ea typeface="+mj-ea"/>
+                <a:cs typeface="+mj-cs"/>
+              </a:rPr>
+            </a:br>
+            <a:r>
+              <a:rPr lang="en-US" sz="6600" kern="1200">
+                <a:solidFill>
+                  <a:schemeClr val="bg1"/>
+                </a:solidFill>
+                <a:latin typeface="+mj-lt"/>
+                <a:ea typeface="+mj-ea"/>
+                <a:cs typeface="+mj-cs"/>
+              </a:rPr>
+              <a:t>Questions?</a:t>
+            </a:r>
+          </a:p>
+        </p:txBody>
+      </p:sp>
+      <p:sp>
+        <p:nvSpPr>
+          <p:cNvPr id="31" name="Rectangle 30">
+            <a:extLst>
+              <a:ext uri="{FF2B5EF4-FFF2-40B4-BE49-F238E27FC236}">
+                <a16:creationId xmlns:a16="http://schemas.microsoft.com/office/drawing/2014/main" id="{B34F5AD2-EDBD-4BBD-A55C-EAFFD0C7097A}"/>
+              </a:ext>
+              <a:ext uri="{C183D7F6-B498-43B3-948B-1728B52AA6E4}">
+                <adec:decorative xmlns:adec="http://schemas.microsoft.com/office/drawing/2017/decorative" val="1"/>
+              </a:ext>
+            </a:extLst>
+          </p:cNvPr>
+          <p:cNvSpPr>
+            <a:spLocks noGrp="1" noRot="1" noChangeAspect="1" noMove="1" noResize="1" noEditPoints="1" noAdjustHandles="1" noChangeArrowheads="1" noChangeShapeType="1" noTextEdit="1"/>
+          </p:cNvSpPr>
+          <p:nvPr>
+            <p:extLst>
+              <p:ext uri="{386F3935-93C4-4BCD-93E2-E3B085C9AB24}">
+                <p16:designElem xmlns:p16="http://schemas.microsoft.com/office/powerpoint/2015/main" val="1"/>
+              </p:ext>
+            </p:extLst>
+          </p:nvPr>
+        </p:nvSpPr>
+        <p:spPr>
+          <a:xfrm>
+            <a:off x="6096000" y="0"/>
+            <a:ext cx="6095990" cy="6858001"/>
+          </a:xfrm>
+          <a:prstGeom prst="rect">
+            <a:avLst/>
+          </a:prstGeom>
+          <a:solidFill>
+            <a:schemeClr val="bg1">
+              <a:lumMod val="95000"/>
+            </a:schemeClr>
+          </a:solidFill>
+          <a:ln>
+            <a:noFill/>
+          </a:ln>
+        </p:spPr>
+        <p:style>
+          <a:lnRef idx="2">
+            <a:schemeClr val="accent1">
+              <a:shade val="50000"/>
+            </a:schemeClr>
+          </a:lnRef>
+          <a:fillRef idx="1">
+            <a:schemeClr val="accent1"/>
+          </a:fillRef>
+          <a:effectRef idx="0">
+            <a:schemeClr val="accent1"/>
+          </a:effectRef>
+          <a:fontRef idx="minor">
+            <a:schemeClr val="lt1"/>
+          </a:fontRef>
+        </p:style>
+        <p:txBody>
+          <a:bodyPr rtlCol="0" anchor="ctr"/>
+          <a:lstStyle/>
+          <a:p>
+            <a:pPr algn="ctr"/>
+            <a:endParaRPr lang="en-US"/>
           </a:p>
         </p:txBody>
       </p:sp>
@@ -3829,6 +7964,98 @@
   <p:clrMapOvr>
     <a:masterClrMapping/>
   </p:clrMapOvr>
+  <p:timing>
+    <p:tnLst>
+      <p:par>
+        <p:cTn id="1" dur="indefinite" restart="never" nodeType="tmRoot">
+          <p:childTnLst>
+            <p:seq concurrent="1" nextAc="seek">
+              <p:cTn id="2" dur="indefinite" nodeType="mainSeq">
+                <p:childTnLst>
+                  <p:par>
+                    <p:cTn id="3" fill="hold">
+                      <p:stCondLst>
+                        <p:cond delay="indefinite"/>
+                        <p:cond evt="onBegin" delay="0">
+                          <p:tn val="2"/>
+                        </p:cond>
+                      </p:stCondLst>
+                      <p:childTnLst>
+                        <p:par>
+                          <p:cTn id="4" fill="hold">
+                            <p:stCondLst>
+                              <p:cond delay="0"/>
+                            </p:stCondLst>
+                            <p:childTnLst>
+                              <p:par>
+                                <p:cTn id="5" presetID="10" presetClass="entr" presetSubtype="0" fill="hold" grpId="0" nodeType="withEffect">
+                                  <p:stCondLst>
+                                    <p:cond delay="500"/>
+                                  </p:stCondLst>
+                                  <p:iterate type="wd">
+                                    <p:tmPct val="15000"/>
+                                  </p:iterate>
+                                  <p:childTnLst>
+                                    <p:set>
+                                      <p:cBhvr>
+                                        <p:cTn id="6" dur="1" fill="hold">
+                                          <p:stCondLst>
+                                            <p:cond delay="0"/>
+                                          </p:stCondLst>
+                                        </p:cTn>
+                                        <p:tgtEl>
+                                          <p:spTgt spid="2"/>
+                                        </p:tgtEl>
+                                        <p:attrNameLst>
+                                          <p:attrName>style.visibility</p:attrName>
+                                        </p:attrNameLst>
+                                      </p:cBhvr>
+                                      <p:to>
+                                        <p:strVal val="visible"/>
+                                      </p:to>
+                                    </p:set>
+                                    <p:animEffect transition="in" filter="fade">
+                                      <p:cBhvr>
+                                        <p:cTn id="7" dur="1000"/>
+                                        <p:tgtEl>
+                                          <p:spTgt spid="2"/>
+                                        </p:tgtEl>
+                                      </p:cBhvr>
+                                    </p:animEffect>
+                                  </p:childTnLst>
+                                </p:cTn>
+                              </p:par>
+                            </p:childTnLst>
+                          </p:cTn>
+                        </p:par>
+                      </p:childTnLst>
+                    </p:cTn>
+                  </p:par>
+                </p:childTnLst>
+              </p:cTn>
+              <p:prevCondLst>
+                <p:cond evt="onPrev" delay="0">
+                  <p:tgtEl>
+                    <p:sldTgt/>
+                  </p:tgtEl>
+                </p:cond>
+              </p:prevCondLst>
+              <p:nextCondLst>
+                <p:cond evt="onNext" delay="0">
+                  <p:tgtEl>
+                    <p:sldTgt/>
+                  </p:tgtEl>
+                </p:cond>
+              </p:nextCondLst>
+            </p:seq>
+          </p:childTnLst>
+        </p:cTn>
+      </p:par>
+    </p:tnLst>
+    <p:bldLst>
+      <p:bldP spid="2" grpId="0"/>
+    </p:bldLst>
+  </p:timing>
 </p:sld>
 </file>
 

</xml_diff>